<commit_message>
enhanced finance > credit cards v2
enhanced finance > credit cards v2
</commit_message>
<xml_diff>
--- a/15finance/02 Credit Cards.pptx
+++ b/15finance/02 Credit Cards.pptx
@@ -5,7 +5,7 @@
     <p:sldMasterId id="2147483648" r:id="rId1"/>
   </p:sldMasterIdLst>
   <p:notesMasterIdLst>
-    <p:notesMasterId r:id="rId11"/>
+    <p:notesMasterId r:id="rId12"/>
   </p:notesMasterIdLst>
   <p:sldIdLst>
     <p:sldId id="256" r:id="rId2"/>
@@ -14,9 +14,10 @@
     <p:sldId id="258" r:id="rId5"/>
     <p:sldId id="265" r:id="rId6"/>
     <p:sldId id="259" r:id="rId7"/>
-    <p:sldId id="261" r:id="rId8"/>
-    <p:sldId id="262" r:id="rId9"/>
-    <p:sldId id="263" r:id="rId10"/>
+    <p:sldId id="266" r:id="rId8"/>
+    <p:sldId id="261" r:id="rId9"/>
+    <p:sldId id="262" r:id="rId10"/>
+    <p:sldId id="263" r:id="rId11"/>
   </p:sldIdLst>
   <p:sldSz cx="9144000" cy="6858000" type="screen4x3"/>
   <p:notesSz cx="6858000" cy="9144000"/>
@@ -200,7 +201,8 @@
           <a:p>
             <a:fld id="{01F3B2B3-38C5-4CBC-9C35-0FEB655F0CFE}" type="datetimeFigureOut">
               <a:rPr lang="en-GB" smtClean="0"/>
-              <a:t>13/11/2016</a:t>
+              <a:pPr/>
+              <a:t>15/11/2016</a:t>
             </a:fld>
             <a:endParaRPr lang="en-GB"/>
           </a:p>
@@ -361,6 +363,7 @@
           <a:p>
             <a:fld id="{C119CCA7-8F36-4874-A533-E76BFE63B534}" type="slidenum">
               <a:rPr lang="en-GB" smtClean="0"/>
+              <a:pPr/>
               <a:t>‹#›</a:t>
             </a:fld>
             <a:endParaRPr lang="en-GB"/>
@@ -532,7 +535,8 @@
           <a:p>
             <a:fld id="{C119CCA7-8F36-4874-A533-E76BFE63B534}" type="slidenum">
               <a:rPr lang="en-GB" smtClean="0"/>
-              <a:t>8</a:t>
+              <a:pPr/>
+              <a:t>9</a:t>
             </a:fld>
             <a:endParaRPr lang="en-GB"/>
           </a:p>
@@ -728,7 +732,7 @@
             <a:fld id="{245E5DCC-A267-489E-8C4B-0C8A611A1888}" type="datetimeFigureOut">
               <a:rPr lang="en-GB" smtClean="0"/>
               <a:pPr/>
-              <a:t>13/11/2016</a:t>
+              <a:t>15/11/2016</a:t>
             </a:fld>
             <a:endParaRPr lang="en-GB"/>
           </a:p>
@@ -780,7 +784,7 @@
     </p:spTree>
     <p:extLst>
       <p:ext uri="{BB962C8B-B14F-4D97-AF65-F5344CB8AC3E}">
-        <p14:creationId xmlns:p14="http://schemas.microsoft.com/office/powerpoint/2010/main" xmlns="" val="3795135744"/>
+        <p14:creationId xmlns="" xmlns:p14="http://schemas.microsoft.com/office/powerpoint/2010/main" val="3795135744"/>
       </p:ext>
     </p:extLst>
   </p:cSld>
@@ -900,7 +904,7 @@
             <a:fld id="{245E5DCC-A267-489E-8C4B-0C8A611A1888}" type="datetimeFigureOut">
               <a:rPr lang="en-GB" smtClean="0"/>
               <a:pPr/>
-              <a:t>13/11/2016</a:t>
+              <a:t>15/11/2016</a:t>
             </a:fld>
             <a:endParaRPr lang="en-GB"/>
           </a:p>
@@ -952,7 +956,7 @@
     </p:spTree>
     <p:extLst>
       <p:ext uri="{BB962C8B-B14F-4D97-AF65-F5344CB8AC3E}">
-        <p14:creationId xmlns:p14="http://schemas.microsoft.com/office/powerpoint/2010/main" xmlns="" val="1650520662"/>
+        <p14:creationId xmlns="" xmlns:p14="http://schemas.microsoft.com/office/powerpoint/2010/main" val="1650520662"/>
       </p:ext>
     </p:extLst>
   </p:cSld>
@@ -1082,7 +1086,7 @@
             <a:fld id="{245E5DCC-A267-489E-8C4B-0C8A611A1888}" type="datetimeFigureOut">
               <a:rPr lang="en-GB" smtClean="0"/>
               <a:pPr/>
-              <a:t>13/11/2016</a:t>
+              <a:t>15/11/2016</a:t>
             </a:fld>
             <a:endParaRPr lang="en-GB"/>
           </a:p>
@@ -1134,7 +1138,7 @@
     </p:spTree>
     <p:extLst>
       <p:ext uri="{BB962C8B-B14F-4D97-AF65-F5344CB8AC3E}">
-        <p14:creationId xmlns:p14="http://schemas.microsoft.com/office/powerpoint/2010/main" xmlns="" val="4271198208"/>
+        <p14:creationId xmlns="" xmlns:p14="http://schemas.microsoft.com/office/powerpoint/2010/main" val="4271198208"/>
       </p:ext>
     </p:extLst>
   </p:cSld>
@@ -1254,7 +1258,7 @@
             <a:fld id="{245E5DCC-A267-489E-8C4B-0C8A611A1888}" type="datetimeFigureOut">
               <a:rPr lang="en-GB" smtClean="0"/>
               <a:pPr/>
-              <a:t>13/11/2016</a:t>
+              <a:t>15/11/2016</a:t>
             </a:fld>
             <a:endParaRPr lang="en-GB"/>
           </a:p>
@@ -1306,7 +1310,7 @@
     </p:spTree>
     <p:extLst>
       <p:ext uri="{BB962C8B-B14F-4D97-AF65-F5344CB8AC3E}">
-        <p14:creationId xmlns:p14="http://schemas.microsoft.com/office/powerpoint/2010/main" xmlns="" val="3395567130"/>
+        <p14:creationId xmlns="" xmlns:p14="http://schemas.microsoft.com/office/powerpoint/2010/main" val="3395567130"/>
       </p:ext>
     </p:extLst>
   </p:cSld>
@@ -1502,7 +1506,7 @@
             <a:fld id="{245E5DCC-A267-489E-8C4B-0C8A611A1888}" type="datetimeFigureOut">
               <a:rPr lang="en-GB" smtClean="0"/>
               <a:pPr/>
-              <a:t>13/11/2016</a:t>
+              <a:t>15/11/2016</a:t>
             </a:fld>
             <a:endParaRPr lang="en-GB"/>
           </a:p>
@@ -1554,7 +1558,7 @@
     </p:spTree>
     <p:extLst>
       <p:ext uri="{BB962C8B-B14F-4D97-AF65-F5344CB8AC3E}">
-        <p14:creationId xmlns:p14="http://schemas.microsoft.com/office/powerpoint/2010/main" xmlns="" val="741615603"/>
+        <p14:creationId xmlns="" xmlns:p14="http://schemas.microsoft.com/office/powerpoint/2010/main" val="741615603"/>
       </p:ext>
     </p:extLst>
   </p:cSld>
@@ -1792,7 +1796,7 @@
             <a:fld id="{245E5DCC-A267-489E-8C4B-0C8A611A1888}" type="datetimeFigureOut">
               <a:rPr lang="en-GB" smtClean="0"/>
               <a:pPr/>
-              <a:t>13/11/2016</a:t>
+              <a:t>15/11/2016</a:t>
             </a:fld>
             <a:endParaRPr lang="en-GB"/>
           </a:p>
@@ -1844,7 +1848,7 @@
     </p:spTree>
     <p:extLst>
       <p:ext uri="{BB962C8B-B14F-4D97-AF65-F5344CB8AC3E}">
-        <p14:creationId xmlns:p14="http://schemas.microsoft.com/office/powerpoint/2010/main" xmlns="" val="2595005895"/>
+        <p14:creationId xmlns="" xmlns:p14="http://schemas.microsoft.com/office/powerpoint/2010/main" val="2595005895"/>
       </p:ext>
     </p:extLst>
   </p:cSld>
@@ -2216,7 +2220,7 @@
             <a:fld id="{245E5DCC-A267-489E-8C4B-0C8A611A1888}" type="datetimeFigureOut">
               <a:rPr lang="en-GB" smtClean="0"/>
               <a:pPr/>
-              <a:t>13/11/2016</a:t>
+              <a:t>15/11/2016</a:t>
             </a:fld>
             <a:endParaRPr lang="en-GB"/>
           </a:p>
@@ -2268,7 +2272,7 @@
     </p:spTree>
     <p:extLst>
       <p:ext uri="{BB962C8B-B14F-4D97-AF65-F5344CB8AC3E}">
-        <p14:creationId xmlns:p14="http://schemas.microsoft.com/office/powerpoint/2010/main" xmlns="" val="2824062158"/>
+        <p14:creationId xmlns="" xmlns:p14="http://schemas.microsoft.com/office/powerpoint/2010/main" val="2824062158"/>
       </p:ext>
     </p:extLst>
   </p:cSld>
@@ -2336,7 +2340,7 @@
             <a:fld id="{245E5DCC-A267-489E-8C4B-0C8A611A1888}" type="datetimeFigureOut">
               <a:rPr lang="en-GB" smtClean="0"/>
               <a:pPr/>
-              <a:t>13/11/2016</a:t>
+              <a:t>15/11/2016</a:t>
             </a:fld>
             <a:endParaRPr lang="en-GB"/>
           </a:p>
@@ -2388,7 +2392,7 @@
     </p:spTree>
     <p:extLst>
       <p:ext uri="{BB962C8B-B14F-4D97-AF65-F5344CB8AC3E}">
-        <p14:creationId xmlns:p14="http://schemas.microsoft.com/office/powerpoint/2010/main" xmlns="" val="1093719169"/>
+        <p14:creationId xmlns="" xmlns:p14="http://schemas.microsoft.com/office/powerpoint/2010/main" val="1093719169"/>
       </p:ext>
     </p:extLst>
   </p:cSld>
@@ -2433,7 +2437,7 @@
             <a:fld id="{245E5DCC-A267-489E-8C4B-0C8A611A1888}" type="datetimeFigureOut">
               <a:rPr lang="en-GB" smtClean="0"/>
               <a:pPr/>
-              <a:t>13/11/2016</a:t>
+              <a:t>15/11/2016</a:t>
             </a:fld>
             <a:endParaRPr lang="en-GB"/>
           </a:p>
@@ -2485,7 +2489,7 @@
     </p:spTree>
     <p:extLst>
       <p:ext uri="{BB962C8B-B14F-4D97-AF65-F5344CB8AC3E}">
-        <p14:creationId xmlns:p14="http://schemas.microsoft.com/office/powerpoint/2010/main" xmlns="" val="3666968362"/>
+        <p14:creationId xmlns="" xmlns:p14="http://schemas.microsoft.com/office/powerpoint/2010/main" val="3666968362"/>
       </p:ext>
     </p:extLst>
   </p:cSld>
@@ -2712,7 +2716,7 @@
             <a:fld id="{245E5DCC-A267-489E-8C4B-0C8A611A1888}" type="datetimeFigureOut">
               <a:rPr lang="en-GB" smtClean="0"/>
               <a:pPr/>
-              <a:t>13/11/2016</a:t>
+              <a:t>15/11/2016</a:t>
             </a:fld>
             <a:endParaRPr lang="en-GB"/>
           </a:p>
@@ -2764,7 +2768,7 @@
     </p:spTree>
     <p:extLst>
       <p:ext uri="{BB962C8B-B14F-4D97-AF65-F5344CB8AC3E}">
-        <p14:creationId xmlns:p14="http://schemas.microsoft.com/office/powerpoint/2010/main" xmlns="" val="3793018940"/>
+        <p14:creationId xmlns="" xmlns:p14="http://schemas.microsoft.com/office/powerpoint/2010/main" val="3793018940"/>
       </p:ext>
     </p:extLst>
   </p:cSld>
@@ -2967,7 +2971,7 @@
             <a:fld id="{245E5DCC-A267-489E-8C4B-0C8A611A1888}" type="datetimeFigureOut">
               <a:rPr lang="en-GB" smtClean="0"/>
               <a:pPr/>
-              <a:t>13/11/2016</a:t>
+              <a:t>15/11/2016</a:t>
             </a:fld>
             <a:endParaRPr lang="en-GB"/>
           </a:p>
@@ -3019,7 +3023,7 @@
     </p:spTree>
     <p:extLst>
       <p:ext uri="{BB962C8B-B14F-4D97-AF65-F5344CB8AC3E}">
-        <p14:creationId xmlns:p14="http://schemas.microsoft.com/office/powerpoint/2010/main" xmlns="" val="1356301842"/>
+        <p14:creationId xmlns="" xmlns:p14="http://schemas.microsoft.com/office/powerpoint/2010/main" val="1356301842"/>
       </p:ext>
     </p:extLst>
   </p:cSld>
@@ -3182,7 +3186,7 @@
             <a:fld id="{245E5DCC-A267-489E-8C4B-0C8A611A1888}" type="datetimeFigureOut">
               <a:rPr lang="en-GB" smtClean="0"/>
               <a:pPr/>
-              <a:t>13/11/2016</a:t>
+              <a:t>15/11/2016</a:t>
             </a:fld>
             <a:endParaRPr lang="en-GB"/>
           </a:p>
@@ -3270,7 +3274,7 @@
     </p:spTree>
     <p:extLst>
       <p:ext uri="{BB962C8B-B14F-4D97-AF65-F5344CB8AC3E}">
-        <p14:creationId xmlns:p14="http://schemas.microsoft.com/office/powerpoint/2010/main" xmlns="" val="4272518248"/>
+        <p14:creationId xmlns="" xmlns:p14="http://schemas.microsoft.com/office/powerpoint/2010/main" val="4272518248"/>
       </p:ext>
     </p:extLst>
   </p:cSld>
@@ -3643,7 +3647,7 @@
           <a:blip r:embed="rId3" cstate="print">
             <a:extLst>
               <a:ext uri="{28A0092B-C50C-407E-A947-70E740481C1C}">
-                <a14:useLocalDpi xmlns:a14="http://schemas.microsoft.com/office/drawing/2010/main" xmlns="" val="0"/>
+                <a14:useLocalDpi xmlns="" xmlns:a14="http://schemas.microsoft.com/office/drawing/2010/main" val="0"/>
               </a:ext>
             </a:extLst>
           </a:blip>
@@ -3664,14 +3668,14 @@
           </a:ln>
           <a:extLst>
             <a:ext uri="{909E8E84-426E-40DD-AFC4-6F175D3DCCD1}">
-              <a14:hiddenFill xmlns:a14="http://schemas.microsoft.com/office/drawing/2010/main" xmlns="">
+              <a14:hiddenFill xmlns="" xmlns:a14="http://schemas.microsoft.com/office/drawing/2010/main">
                 <a:solidFill>
                   <a:schemeClr val="accent1"/>
                 </a:solidFill>
               </a14:hiddenFill>
             </a:ext>
             <a:ext uri="{91240B29-F687-4F45-9708-019B960494DF}">
-              <a14:hiddenLine xmlns:a14="http://schemas.microsoft.com/office/drawing/2010/main" xmlns="" w="9525">
+              <a14:hiddenLine xmlns="" xmlns:a14="http://schemas.microsoft.com/office/drawing/2010/main" w="9525">
                 <a:solidFill>
                   <a:schemeClr val="tx1"/>
                 </a:solidFill>
@@ -3686,7 +3690,7 @@
     </p:spTree>
     <p:extLst>
       <p:ext uri="{BB962C8B-B14F-4D97-AF65-F5344CB8AC3E}">
-        <p14:creationId xmlns:p14="http://schemas.microsoft.com/office/powerpoint/2010/main" xmlns="" val="2713532967"/>
+        <p14:creationId xmlns="" xmlns:p14="http://schemas.microsoft.com/office/powerpoint/2010/main" val="2713532967"/>
       </p:ext>
     </p:extLst>
   </p:cSld>
@@ -3694,13 +3698,172 @@
     <a:masterClrMapping/>
   </p:clrMapOvr>
   <mc:AlternateContent xmlns:mc="http://schemas.openxmlformats.org/markup-compatibility/2006">
-    <mc:Choice xmlns:p14="http://schemas.microsoft.com/office/powerpoint/2010/main" xmlns="" Requires="p14">
+    <mc:Choice xmlns="" xmlns:p14="http://schemas.microsoft.com/office/powerpoint/2010/main" Requires="p14">
       <p:transition spd="slow" p14:dur="2000"/>
     </mc:Choice>
     <mc:Fallback>
       <p:transition spd="slow"/>
     </mc:Fallback>
   </mc:AlternateContent>
+  <p:timing>
+    <p:tnLst>
+      <p:par>
+        <p:cTn id="1" dur="indefinite" restart="never" nodeType="tmRoot"/>
+      </p:par>
+    </p:tnLst>
+  </p:timing>
+</p:sld>
+</file>
+
+<file path=ppt/slides/slide10.xml><?xml version="1.0" encoding="utf-8"?>
+<p:sld xmlns:a="http://schemas.openxmlformats.org/drawingml/2006/main" xmlns:r="http://schemas.openxmlformats.org/officeDocument/2006/relationships" xmlns:p="http://schemas.openxmlformats.org/presentationml/2006/main">
+  <p:cSld>
+    <p:spTree>
+      <p:nvGrpSpPr>
+        <p:cNvPr id="1" name=""/>
+        <p:cNvGrpSpPr/>
+        <p:nvPr/>
+      </p:nvGrpSpPr>
+      <p:grpSpPr>
+        <a:xfrm>
+          <a:off x="0" y="0"/>
+          <a:ext cx="0" cy="0"/>
+          <a:chOff x="0" y="0"/>
+          <a:chExt cx="0" cy="0"/>
+        </a:xfrm>
+      </p:grpSpPr>
+      <p:sp>
+        <p:nvSpPr>
+          <p:cNvPr id="2" name="TextBox 1"/>
+          <p:cNvSpPr txBox="1"/>
+          <p:nvPr/>
+        </p:nvSpPr>
+        <p:spPr>
+          <a:xfrm>
+            <a:off x="0" y="762963"/>
+            <a:ext cx="9144000" cy="2308324"/>
+          </a:xfrm>
+          <a:prstGeom prst="rect">
+            <a:avLst/>
+          </a:prstGeom>
+          <a:noFill/>
+        </p:spPr>
+        <p:txBody>
+          <a:bodyPr wrap="square" rtlCol="0">
+            <a:spAutoFit/>
+          </a:bodyPr>
+          <a:lstStyle/>
+          <a:p>
+            <a:pPr algn="ctr"/>
+            <a:r>
+              <a:rPr lang="en-GB" sz="7200" b="1" dirty="0" smtClean="0">
+                <a:solidFill>
+                  <a:srgbClr val="FF0000"/>
+                </a:solidFill>
+                <a:latin typeface="Comic Sans MS" panose="030F0702030302020204" pitchFamily="66" charset="0"/>
+              </a:rPr>
+              <a:t>Let’s see your credit cards </a:t>
+            </a:r>
+            <a:endParaRPr lang="en-GB" sz="7200" b="1" dirty="0">
+              <a:solidFill>
+                <a:srgbClr val="FF0000"/>
+              </a:solidFill>
+              <a:latin typeface="Comic Sans MS" panose="030F0702030302020204" pitchFamily="66" charset="0"/>
+            </a:endParaRPr>
+          </a:p>
+        </p:txBody>
+      </p:sp>
+      <p:sp>
+        <p:nvSpPr>
+          <p:cNvPr id="3" name="Rectangle 2"/>
+          <p:cNvSpPr/>
+          <p:nvPr/>
+        </p:nvSpPr>
+        <p:spPr>
+          <a:xfrm>
+            <a:off x="2051720" y="3429000"/>
+            <a:ext cx="5256584" cy="2592288"/>
+          </a:xfrm>
+          <a:prstGeom prst="rect">
+            <a:avLst/>
+          </a:prstGeom>
+          <a:noFill/>
+          <a:ln w="76200">
+            <a:solidFill>
+              <a:schemeClr val="tx1"/>
+            </a:solidFill>
+          </a:ln>
+        </p:spPr>
+        <p:style>
+          <a:lnRef idx="2">
+            <a:schemeClr val="accent1">
+              <a:shade val="50000"/>
+            </a:schemeClr>
+          </a:lnRef>
+          <a:fillRef idx="1">
+            <a:schemeClr val="accent1"/>
+          </a:fillRef>
+          <a:effectRef idx="0">
+            <a:schemeClr val="accent1"/>
+          </a:effectRef>
+          <a:fontRef idx="minor">
+            <a:schemeClr val="lt1"/>
+          </a:fontRef>
+        </p:style>
+        <p:txBody>
+          <a:bodyPr rtlCol="0" anchor="ctr"/>
+          <a:lstStyle/>
+          <a:p>
+            <a:pPr algn="ctr"/>
+            <a:endParaRPr lang="en-GB"/>
+          </a:p>
+        </p:txBody>
+      </p:sp>
+      <p:sp>
+        <p:nvSpPr>
+          <p:cNvPr id="4" name="TextBox 3"/>
+          <p:cNvSpPr txBox="1"/>
+          <p:nvPr/>
+        </p:nvSpPr>
+        <p:spPr>
+          <a:xfrm>
+            <a:off x="4283968" y="3617147"/>
+            <a:ext cx="792088" cy="2215991"/>
+          </a:xfrm>
+          <a:prstGeom prst="rect">
+            <a:avLst/>
+          </a:prstGeom>
+          <a:noFill/>
+        </p:spPr>
+        <p:txBody>
+          <a:bodyPr wrap="square" rtlCol="0">
+            <a:spAutoFit/>
+          </a:bodyPr>
+          <a:lstStyle/>
+          <a:p>
+            <a:pPr algn="ctr"/>
+            <a:r>
+              <a:rPr lang="en-GB" sz="13800" b="1" dirty="0" smtClean="0">
+                <a:latin typeface="Comic Sans MS" panose="030F0702030302020204" pitchFamily="66" charset="0"/>
+              </a:rPr>
+              <a:t>?</a:t>
+            </a:r>
+            <a:endParaRPr lang="en-GB" sz="13800" b="1" dirty="0">
+              <a:latin typeface="Comic Sans MS" panose="030F0702030302020204" pitchFamily="66" charset="0"/>
+            </a:endParaRPr>
+          </a:p>
+        </p:txBody>
+      </p:sp>
+    </p:spTree>
+    <p:extLst>
+      <p:ext uri="{BB962C8B-B14F-4D97-AF65-F5344CB8AC3E}">
+        <p14:creationId xmlns="" xmlns:p14="http://schemas.microsoft.com/office/powerpoint/2010/main" val="2946536019"/>
+      </p:ext>
+    </p:extLst>
+  </p:cSld>
+  <p:clrMapOvr>
+    <a:masterClrMapping/>
+  </p:clrMapOvr>
   <p:timing>
     <p:tnLst>
       <p:par>
@@ -3778,7 +3941,7 @@
     </p:spTree>
     <p:extLst>
       <p:ext uri="{BB962C8B-B14F-4D97-AF65-F5344CB8AC3E}">
-        <p14:creationId xmlns:p14="http://schemas.microsoft.com/office/powerpoint/2010/main" xmlns="" val="3429634830"/>
+        <p14:creationId xmlns="" xmlns:p14="http://schemas.microsoft.com/office/powerpoint/2010/main" val="3429634830"/>
       </p:ext>
     </p:extLst>
   </p:cSld>
@@ -3867,7 +4030,7 @@
     </p:spTree>
     <p:extLst>
       <p:ext uri="{BB962C8B-B14F-4D97-AF65-F5344CB8AC3E}">
-        <p14:creationId xmlns:p14="http://schemas.microsoft.com/office/powerpoint/2010/main" xmlns="" val="509015518"/>
+        <p14:creationId xmlns="" xmlns:p14="http://schemas.microsoft.com/office/powerpoint/2010/main" val="509015518"/>
       </p:ext>
     </p:extLst>
   </p:cSld>
@@ -3966,7 +4129,7 @@
     </p:spTree>
     <p:extLst>
       <p:ext uri="{BB962C8B-B14F-4D97-AF65-F5344CB8AC3E}">
-        <p14:creationId xmlns:p14="http://schemas.microsoft.com/office/powerpoint/2010/main" xmlns="" val="1087716692"/>
+        <p14:creationId xmlns="" xmlns:p14="http://schemas.microsoft.com/office/powerpoint/2010/main" val="1087716692"/>
       </p:ext>
     </p:extLst>
   </p:cSld>
@@ -4050,7 +4213,7 @@
     </p:spTree>
     <p:extLst>
       <p:ext uri="{BB962C8B-B14F-4D97-AF65-F5344CB8AC3E}">
-        <p14:creationId xmlns:p14="http://schemas.microsoft.com/office/powerpoint/2010/main" xmlns="" val="2796773158"/>
+        <p14:creationId xmlns="" xmlns:p14="http://schemas.microsoft.com/office/powerpoint/2010/main" val="2796773158"/>
       </p:ext>
     </p:extLst>
   </p:cSld>
@@ -4679,7 +4842,7 @@
           <a:blip r:embed="rId2" cstate="print">
             <a:extLst>
               <a:ext uri="{28A0092B-C50C-407E-A947-70E740481C1C}">
-                <a14:useLocalDpi xmlns:a14="http://schemas.microsoft.com/office/drawing/2010/main" xmlns="" val="0"/>
+                <a14:useLocalDpi xmlns="" xmlns:a14="http://schemas.microsoft.com/office/drawing/2010/main" val="0"/>
               </a:ext>
             </a:extLst>
           </a:blip>
@@ -4704,7 +4867,7 @@
           </a:ln>
           <a:extLst>
             <a:ext uri="{909E8E84-426E-40DD-AFC4-6F175D3DCCD1}">
-              <a14:hiddenFill xmlns:a14="http://schemas.microsoft.com/office/drawing/2010/main" xmlns="">
+              <a14:hiddenFill xmlns="" xmlns:a14="http://schemas.microsoft.com/office/drawing/2010/main">
                 <a:solidFill>
                   <a:srgbClr val="FFFFFF"/>
                 </a:solidFill>
@@ -4725,7 +4888,7 @@
           <a:blip r:embed="rId3" cstate="print">
             <a:extLst>
               <a:ext uri="{28A0092B-C50C-407E-A947-70E740481C1C}">
-                <a14:useLocalDpi xmlns:a14="http://schemas.microsoft.com/office/drawing/2010/main" xmlns="" val="0"/>
+                <a14:useLocalDpi xmlns="" xmlns:a14="http://schemas.microsoft.com/office/drawing/2010/main" val="0"/>
               </a:ext>
             </a:extLst>
           </a:blip>
@@ -4748,7 +4911,7 @@
           </a:ln>
           <a:extLst>
             <a:ext uri="{909E8E84-426E-40DD-AFC4-6F175D3DCCD1}">
-              <a14:hiddenFill xmlns:a14="http://schemas.microsoft.com/office/drawing/2010/main" xmlns="">
+              <a14:hiddenFill xmlns="" xmlns:a14="http://schemas.microsoft.com/office/drawing/2010/main">
                 <a:solidFill>
                   <a:srgbClr val="FFFFFF"/>
                 </a:solidFill>
@@ -4771,7 +4934,7 @@
           <a:blip r:embed="rId5" cstate="print">
             <a:extLst>
               <a:ext uri="{28A0092B-C50C-407E-A947-70E740481C1C}">
-                <a14:useLocalDpi xmlns:a14="http://schemas.microsoft.com/office/drawing/2010/main" xmlns="" val="0"/>
+                <a14:useLocalDpi xmlns="" xmlns:a14="http://schemas.microsoft.com/office/drawing/2010/main" val="0"/>
               </a:ext>
             </a:extLst>
           </a:blip>
@@ -4791,7 +4954,7 @@
           <a:noFill/>
           <a:extLst>
             <a:ext uri="{909E8E84-426E-40DD-AFC4-6F175D3DCCD1}">
-              <a14:hiddenFill xmlns:a14="http://schemas.microsoft.com/office/drawing/2010/main" xmlns="">
+              <a14:hiddenFill xmlns="" xmlns:a14="http://schemas.microsoft.com/office/drawing/2010/main">
                 <a:solidFill>
                   <a:srgbClr val="FFFFFF"/>
                 </a:solidFill>
@@ -4843,7 +5006,25 @@
                 </a:solidFill>
                 <a:latin typeface="Comic Sans MS" panose="030F0702030302020204" pitchFamily="66" charset="0"/>
               </a:rPr>
-              <a:t>On each credit card you have borrow £1200 .</a:t>
+              <a:t>On each credit card you have </a:t>
+            </a:r>
+            <a:r>
+              <a:rPr lang="en-GB" b="1" dirty="0" smtClean="0">
+                <a:solidFill>
+                  <a:srgbClr val="FF0000"/>
+                </a:solidFill>
+                <a:latin typeface="Comic Sans MS" panose="030F0702030302020204" pitchFamily="66" charset="0"/>
+              </a:rPr>
+              <a:t>to borrow </a:t>
+            </a:r>
+            <a:r>
+              <a:rPr lang="en-GB" b="1" dirty="0" smtClean="0">
+                <a:solidFill>
+                  <a:srgbClr val="FF0000"/>
+                </a:solidFill>
+                <a:latin typeface="Comic Sans MS" panose="030F0702030302020204" pitchFamily="66" charset="0"/>
+              </a:rPr>
+              <a:t>£1200 .</a:t>
             </a:r>
           </a:p>
           <a:p>
@@ -4925,10 +5106,40 @@
           </a:p>
         </p:txBody>
       </p:sp>
+      <p:sp>
+        <p:nvSpPr>
+          <p:cNvPr id="16" name="TextBox 15"/>
+          <p:cNvSpPr txBox="1"/>
+          <p:nvPr/>
+        </p:nvSpPr>
+        <p:spPr>
+          <a:xfrm>
+            <a:off x="6876256" y="4653136"/>
+            <a:ext cx="2088232" cy="830997"/>
+          </a:xfrm>
+          <a:prstGeom prst="rect">
+            <a:avLst/>
+          </a:prstGeom>
+          <a:noFill/>
+        </p:spPr>
+        <p:txBody>
+          <a:bodyPr wrap="square" rtlCol="0">
+            <a:spAutoFit/>
+          </a:bodyPr>
+          <a:lstStyle/>
+          <a:p>
+            <a:r>
+              <a:rPr lang="en-GB" sz="2400" dirty="0" smtClean="0"/>
+              <a:t>Enter Answers on Next Slide</a:t>
+            </a:r>
+            <a:endParaRPr lang="en-GB" sz="2400" dirty="0"/>
+          </a:p>
+        </p:txBody>
+      </p:sp>
     </p:spTree>
     <p:extLst>
       <p:ext uri="{BB962C8B-B14F-4D97-AF65-F5344CB8AC3E}">
-        <p14:creationId xmlns:p14="http://schemas.microsoft.com/office/powerpoint/2010/main" xmlns="" val="1406374480"/>
+        <p14:creationId xmlns="" xmlns:p14="http://schemas.microsoft.com/office/powerpoint/2010/main" val="1406374480"/>
       </p:ext>
     </p:extLst>
   </p:cSld>
@@ -4962,6 +5173,332 @@
           <a:chExt cx="0" cy="0"/>
         </a:xfrm>
       </p:grpSpPr>
+      <p:graphicFrame>
+        <p:nvGraphicFramePr>
+          <p:cNvPr id="2" name="Table 1"/>
+          <p:cNvGraphicFramePr>
+            <a:graphicFrameLocks noGrp="1"/>
+          </p:cNvGraphicFramePr>
+          <p:nvPr/>
+        </p:nvGraphicFramePr>
+        <p:xfrm>
+          <a:off x="251520" y="476672"/>
+          <a:ext cx="8568950" cy="5184576"/>
+        </p:xfrm>
+        <a:graphic>
+          <a:graphicData uri="http://schemas.openxmlformats.org/drawingml/2006/table">
+            <a:tbl>
+              <a:tblPr firstRow="1" bandRow="1">
+                <a:tableStyleId>{5C22544A-7EE6-4342-B048-85BDC9FD1C3A}</a:tableStyleId>
+              </a:tblPr>
+              <a:tblGrid>
+                <a:gridCol w="1713790"/>
+                <a:gridCol w="1713790"/>
+                <a:gridCol w="1713790"/>
+                <a:gridCol w="1713790"/>
+                <a:gridCol w="1713790"/>
+              </a:tblGrid>
+              <a:tr h="1296144">
+                <a:tc>
+                  <a:txBody>
+                    <a:bodyPr/>
+                    <a:lstStyle/>
+                    <a:p>
+                      <a:pPr algn="ctr"/>
+                      <a:r>
+                        <a:rPr lang="en-GB" sz="4000" dirty="0" smtClean="0"/>
+                        <a:t>Card</a:t>
+                      </a:r>
+                      <a:endParaRPr lang="en-GB" sz="4000" dirty="0"/>
+                    </a:p>
+                  </a:txBody>
+                  <a:tcPr anchor="ctr"/>
+                </a:tc>
+                <a:tc>
+                  <a:txBody>
+                    <a:bodyPr/>
+                    <a:lstStyle/>
+                    <a:p>
+                      <a:pPr algn="ctr"/>
+                      <a:r>
+                        <a:rPr lang="en-GB" sz="4000" dirty="0" smtClean="0"/>
+                        <a:t>APR %</a:t>
+                      </a:r>
+                      <a:endParaRPr lang="en-GB" sz="4000" dirty="0"/>
+                    </a:p>
+                  </a:txBody>
+                  <a:tcPr anchor="ctr"/>
+                </a:tc>
+                <a:tc>
+                  <a:txBody>
+                    <a:bodyPr/>
+                    <a:lstStyle/>
+                    <a:p>
+                      <a:pPr algn="ctr"/>
+                      <a:r>
+                        <a:rPr lang="en-GB" sz="4000" dirty="0" smtClean="0"/>
+                        <a:t>1 year</a:t>
+                      </a:r>
+                      <a:endParaRPr lang="en-GB" sz="4000" dirty="0"/>
+                    </a:p>
+                  </a:txBody>
+                  <a:tcPr anchor="ctr"/>
+                </a:tc>
+                <a:tc>
+                  <a:txBody>
+                    <a:bodyPr/>
+                    <a:lstStyle/>
+                    <a:p>
+                      <a:pPr algn="ctr"/>
+                      <a:r>
+                        <a:rPr lang="en-GB" sz="4000" dirty="0" smtClean="0"/>
+                        <a:t>3 years</a:t>
+                      </a:r>
+                      <a:endParaRPr lang="en-GB" sz="4000" dirty="0"/>
+                    </a:p>
+                  </a:txBody>
+                  <a:tcPr anchor="ctr"/>
+                </a:tc>
+                <a:tc>
+                  <a:txBody>
+                    <a:bodyPr/>
+                    <a:lstStyle/>
+                    <a:p>
+                      <a:pPr algn="ctr"/>
+                      <a:r>
+                        <a:rPr lang="en-GB" sz="4000" dirty="0" smtClean="0"/>
+                        <a:t>5 years</a:t>
+                      </a:r>
+                      <a:endParaRPr lang="en-GB" sz="4000" dirty="0"/>
+                    </a:p>
+                  </a:txBody>
+                  <a:tcPr anchor="ctr"/>
+                </a:tc>
+              </a:tr>
+              <a:tr h="1296144">
+                <a:tc>
+                  <a:txBody>
+                    <a:bodyPr/>
+                    <a:lstStyle/>
+                    <a:p>
+                      <a:pPr algn="ctr"/>
+                      <a:r>
+                        <a:rPr lang="en-GB" sz="4000" dirty="0" smtClean="0"/>
+                        <a:t>Card 1</a:t>
+                      </a:r>
+                      <a:endParaRPr lang="en-GB" sz="4000" dirty="0"/>
+                    </a:p>
+                  </a:txBody>
+                  <a:tcPr anchor="ctr"/>
+                </a:tc>
+                <a:tc>
+                  <a:txBody>
+                    <a:bodyPr/>
+                    <a:lstStyle/>
+                    <a:p>
+                      <a:pPr algn="ctr"/>
+                      <a:r>
+                        <a:rPr lang="en-GB" sz="4000" dirty="0" smtClean="0"/>
+                        <a:t>18.9</a:t>
+                      </a:r>
+                      <a:endParaRPr lang="en-GB" sz="4000" dirty="0"/>
+                    </a:p>
+                  </a:txBody>
+                  <a:tcPr anchor="ctr"/>
+                </a:tc>
+                <a:tc>
+                  <a:txBody>
+                    <a:bodyPr/>
+                    <a:lstStyle/>
+                    <a:p>
+                      <a:pPr algn="ctr"/>
+                      <a:endParaRPr lang="en-GB" sz="4000" dirty="0"/>
+                    </a:p>
+                  </a:txBody>
+                  <a:tcPr anchor="ctr"/>
+                </a:tc>
+                <a:tc>
+                  <a:txBody>
+                    <a:bodyPr/>
+                    <a:lstStyle/>
+                    <a:p>
+                      <a:pPr algn="ctr"/>
+                      <a:endParaRPr lang="en-GB" sz="4000" dirty="0"/>
+                    </a:p>
+                  </a:txBody>
+                  <a:tcPr anchor="ctr"/>
+                </a:tc>
+                <a:tc>
+                  <a:txBody>
+                    <a:bodyPr/>
+                    <a:lstStyle/>
+                    <a:p>
+                      <a:pPr algn="ctr"/>
+                      <a:endParaRPr lang="en-GB" sz="4000" dirty="0"/>
+                    </a:p>
+                  </a:txBody>
+                  <a:tcPr anchor="ctr"/>
+                </a:tc>
+              </a:tr>
+              <a:tr h="1296144">
+                <a:tc>
+                  <a:txBody>
+                    <a:bodyPr/>
+                    <a:lstStyle/>
+                    <a:p>
+                      <a:pPr algn="ctr"/>
+                      <a:r>
+                        <a:rPr lang="en-GB" sz="4000" dirty="0" smtClean="0"/>
+                        <a:t>Card 2</a:t>
+                      </a:r>
+                      <a:endParaRPr lang="en-GB" sz="4000" dirty="0"/>
+                    </a:p>
+                  </a:txBody>
+                  <a:tcPr anchor="ctr"/>
+                </a:tc>
+                <a:tc>
+                  <a:txBody>
+                    <a:bodyPr/>
+                    <a:lstStyle/>
+                    <a:p>
+                      <a:pPr algn="ctr"/>
+                      <a:r>
+                        <a:rPr lang="en-GB" sz="4000" dirty="0" smtClean="0"/>
+                        <a:t>29.8</a:t>
+                      </a:r>
+                      <a:endParaRPr lang="en-GB" sz="4000" dirty="0"/>
+                    </a:p>
+                  </a:txBody>
+                  <a:tcPr anchor="ctr"/>
+                </a:tc>
+                <a:tc>
+                  <a:txBody>
+                    <a:bodyPr/>
+                    <a:lstStyle/>
+                    <a:p>
+                      <a:pPr algn="ctr"/>
+                      <a:endParaRPr lang="en-GB" sz="4000"/>
+                    </a:p>
+                  </a:txBody>
+                  <a:tcPr anchor="ctr"/>
+                </a:tc>
+                <a:tc>
+                  <a:txBody>
+                    <a:bodyPr/>
+                    <a:lstStyle/>
+                    <a:p>
+                      <a:pPr algn="ctr"/>
+                      <a:endParaRPr lang="en-GB" sz="4000" dirty="0"/>
+                    </a:p>
+                  </a:txBody>
+                  <a:tcPr anchor="ctr"/>
+                </a:tc>
+                <a:tc>
+                  <a:txBody>
+                    <a:bodyPr/>
+                    <a:lstStyle/>
+                    <a:p>
+                      <a:pPr algn="ctr"/>
+                      <a:endParaRPr lang="en-GB" sz="4000" dirty="0"/>
+                    </a:p>
+                  </a:txBody>
+                  <a:tcPr anchor="ctr"/>
+                </a:tc>
+              </a:tr>
+              <a:tr h="1296144">
+                <a:tc>
+                  <a:txBody>
+                    <a:bodyPr/>
+                    <a:lstStyle/>
+                    <a:p>
+                      <a:pPr algn="ctr"/>
+                      <a:r>
+                        <a:rPr lang="en-GB" sz="4000" dirty="0" smtClean="0"/>
+                        <a:t>Card 3</a:t>
+                      </a:r>
+                      <a:endParaRPr lang="en-GB" sz="4000" dirty="0"/>
+                    </a:p>
+                  </a:txBody>
+                  <a:tcPr anchor="ctr"/>
+                </a:tc>
+                <a:tc>
+                  <a:txBody>
+                    <a:bodyPr/>
+                    <a:lstStyle/>
+                    <a:p>
+                      <a:pPr algn="ctr"/>
+                      <a:r>
+                        <a:rPr lang="en-GB" sz="4000" dirty="0" smtClean="0"/>
+                        <a:t>39.9</a:t>
+                      </a:r>
+                      <a:endParaRPr lang="en-GB" sz="4000" dirty="0"/>
+                    </a:p>
+                  </a:txBody>
+                  <a:tcPr anchor="ctr"/>
+                </a:tc>
+                <a:tc>
+                  <a:txBody>
+                    <a:bodyPr/>
+                    <a:lstStyle/>
+                    <a:p>
+                      <a:pPr algn="ctr"/>
+                      <a:endParaRPr lang="en-GB" sz="4000"/>
+                    </a:p>
+                  </a:txBody>
+                  <a:tcPr anchor="ctr"/>
+                </a:tc>
+                <a:tc>
+                  <a:txBody>
+                    <a:bodyPr/>
+                    <a:lstStyle/>
+                    <a:p>
+                      <a:pPr algn="ctr"/>
+                      <a:endParaRPr lang="en-GB" sz="4000" dirty="0"/>
+                    </a:p>
+                  </a:txBody>
+                  <a:tcPr anchor="ctr"/>
+                </a:tc>
+                <a:tc>
+                  <a:txBody>
+                    <a:bodyPr/>
+                    <a:lstStyle/>
+                    <a:p>
+                      <a:pPr algn="ctr"/>
+                      <a:endParaRPr lang="en-GB" sz="4000" dirty="0"/>
+                    </a:p>
+                  </a:txBody>
+                  <a:tcPr anchor="ctr"/>
+                </a:tc>
+              </a:tr>
+            </a:tbl>
+          </a:graphicData>
+        </a:graphic>
+      </p:graphicFrame>
+    </p:spTree>
+  </p:cSld>
+  <p:clrMapOvr>
+    <a:masterClrMapping/>
+  </p:clrMapOvr>
+</p:sld>
+</file>
+
+<file path=ppt/slides/slide8.xml><?xml version="1.0" encoding="utf-8"?>
+<p:sld xmlns:a="http://schemas.openxmlformats.org/drawingml/2006/main" xmlns:r="http://schemas.openxmlformats.org/officeDocument/2006/relationships" xmlns:p="http://schemas.openxmlformats.org/presentationml/2006/main">
+  <p:cSld>
+    <p:spTree>
+      <p:nvGrpSpPr>
+        <p:cNvPr id="1" name=""/>
+        <p:cNvGrpSpPr/>
+        <p:nvPr/>
+      </p:nvGrpSpPr>
+      <p:grpSpPr>
+        <a:xfrm>
+          <a:off x="0" y="0"/>
+          <a:ext cx="0" cy="0"/>
+          <a:chOff x="0" y="0"/>
+          <a:chExt cx="0" cy="0"/>
+        </a:xfrm>
+      </p:grpSpPr>
       <p:sp>
         <p:nvSpPr>
           <p:cNvPr id="2" name="TextBox 1"/>
@@ -5030,7 +5567,7 @@
           <a:blip r:embed="rId2" cstate="print">
             <a:extLst>
               <a:ext uri="{28A0092B-C50C-407E-A947-70E740481C1C}">
-                <a14:useLocalDpi xmlns:a14="http://schemas.microsoft.com/office/drawing/2010/main" xmlns="" val="0"/>
+                <a14:useLocalDpi xmlns="" xmlns:a14="http://schemas.microsoft.com/office/drawing/2010/main" val="0"/>
               </a:ext>
             </a:extLst>
           </a:blip>
@@ -5053,14 +5590,14 @@
           </a:ln>
           <a:extLst>
             <a:ext uri="{909E8E84-426E-40DD-AFC4-6F175D3DCCD1}">
-              <a14:hiddenFill xmlns:a14="http://schemas.microsoft.com/office/drawing/2010/main" xmlns="">
+              <a14:hiddenFill xmlns="" xmlns:a14="http://schemas.microsoft.com/office/drawing/2010/main">
                 <a:solidFill>
                   <a:schemeClr val="accent1"/>
                 </a:solidFill>
               </a14:hiddenFill>
             </a:ext>
             <a:ext uri="{91240B29-F687-4F45-9708-019B960494DF}">
-              <a14:hiddenLine xmlns:a14="http://schemas.microsoft.com/office/drawing/2010/main" xmlns="" w="9525">
+              <a14:hiddenLine xmlns="" xmlns:a14="http://schemas.microsoft.com/office/drawing/2010/main" w="9525">
                 <a:solidFill>
                   <a:schemeClr val="tx1"/>
                 </a:solidFill>
@@ -5075,7 +5612,7 @@
     </p:spTree>
     <p:extLst>
       <p:ext uri="{BB962C8B-B14F-4D97-AF65-F5344CB8AC3E}">
-        <p14:creationId xmlns:p14="http://schemas.microsoft.com/office/powerpoint/2010/main" xmlns="" val="2399019395"/>
+        <p14:creationId xmlns="" xmlns:p14="http://schemas.microsoft.com/office/powerpoint/2010/main" val="2399019395"/>
       </p:ext>
     </p:extLst>
   </p:cSld>
@@ -5092,7 +5629,7 @@
 </p:sld>
 </file>
 
-<file path=ppt/slides/slide8.xml><?xml version="1.0" encoding="utf-8"?>
+<file path=ppt/slides/slide9.xml><?xml version="1.0" encoding="utf-8"?>
 <p:sld xmlns:a="http://schemas.openxmlformats.org/drawingml/2006/main" xmlns:r="http://schemas.openxmlformats.org/officeDocument/2006/relationships" xmlns:p="http://schemas.openxmlformats.org/presentationml/2006/main">
   <p:cSld>
     <p:spTree>
@@ -5263,19 +5800,7 @@
               <a:rPr lang="en-GB" b="1" dirty="0" smtClean="0">
                 <a:latin typeface="Comic Sans MS" panose="030F0702030302020204" pitchFamily="66" charset="0"/>
               </a:rPr>
-              <a:t>Describe the advantages and disadvantages </a:t>
-            </a:r>
-            <a:r>
-              <a:rPr lang="en-GB" b="1" dirty="0" smtClean="0">
-                <a:latin typeface="Comic Sans MS" panose="030F0702030302020204" pitchFamily="66" charset="0"/>
-              </a:rPr>
-              <a:t>of </a:t>
-            </a:r>
-            <a:r>
-              <a:rPr lang="en-GB" b="1" dirty="0" smtClean="0">
-                <a:latin typeface="Comic Sans MS" panose="030F0702030302020204" pitchFamily="66" charset="0"/>
-              </a:rPr>
-              <a:t>your card  </a:t>
+              <a:t>Describe the advantages and disadvantages of your card  </a:t>
             </a:r>
           </a:p>
           <a:p>
@@ -5366,19 +5891,7 @@
               <a:rPr lang="en-GB" b="1" dirty="0" smtClean="0">
                 <a:latin typeface="Comic Sans MS" panose="030F0702030302020204" pitchFamily="66" charset="0"/>
               </a:rPr>
-              <a:t>Describe the advantages and disadvantages </a:t>
-            </a:r>
-            <a:r>
-              <a:rPr lang="en-GB" b="1" dirty="0" smtClean="0">
-                <a:latin typeface="Comic Sans MS" panose="030F0702030302020204" pitchFamily="66" charset="0"/>
-              </a:rPr>
-              <a:t>of </a:t>
-            </a:r>
-            <a:r>
-              <a:rPr lang="en-GB" b="1" dirty="0" smtClean="0">
-                <a:latin typeface="Comic Sans MS" panose="030F0702030302020204" pitchFamily="66" charset="0"/>
-              </a:rPr>
-              <a:t>your card  </a:t>
+              <a:t>Describe the advantages and disadvantages of your card  </a:t>
             </a:r>
           </a:p>
           <a:p>
@@ -5417,6 +5930,7 @@
                     <a:bodyPr/>
                     <a:lstStyle/>
                     <a:p>
+                      <a:pPr algn="ctr"/>
                       <a:r>
                         <a:rPr lang="en-GB" dirty="0" smtClean="0"/>
                         <a:t>Option</a:t>
@@ -5424,13 +5938,14 @@
                       <a:endParaRPr lang="en-GB" dirty="0"/>
                     </a:p>
                   </a:txBody>
-                  <a:tcPr/>
+                  <a:tcPr anchor="ctr"/>
                 </a:tc>
                 <a:tc>
                   <a:txBody>
                     <a:bodyPr/>
                     <a:lstStyle/>
                     <a:p>
+                      <a:pPr algn="ctr"/>
                       <a:r>
                         <a:rPr lang="en-GB" dirty="0" smtClean="0"/>
                         <a:t>APR</a:t>
@@ -5438,13 +5953,14 @@
                       <a:endParaRPr lang="en-GB" dirty="0"/>
                     </a:p>
                   </a:txBody>
-                  <a:tcPr/>
+                  <a:tcPr anchor="ctr"/>
                 </a:tc>
                 <a:tc>
                   <a:txBody>
                     <a:bodyPr/>
                     <a:lstStyle/>
                     <a:p>
+                      <a:pPr algn="ctr"/>
                       <a:r>
                         <a:rPr lang="en-GB" dirty="0" smtClean="0"/>
                         <a:t>Borrowing Limit</a:t>
@@ -5452,13 +5968,14 @@
                       <a:endParaRPr lang="en-GB" dirty="0"/>
                     </a:p>
                   </a:txBody>
-                  <a:tcPr/>
+                  <a:tcPr anchor="ctr"/>
                 </a:tc>
                 <a:tc>
                   <a:txBody>
                     <a:bodyPr/>
                     <a:lstStyle/>
                     <a:p>
+                      <a:pPr algn="ctr"/>
                       <a:r>
                         <a:rPr lang="en-GB" dirty="0" smtClean="0"/>
                         <a:t>Advantages</a:t>
@@ -5466,13 +5983,14 @@
                       <a:endParaRPr lang="en-GB" dirty="0"/>
                     </a:p>
                   </a:txBody>
-                  <a:tcPr/>
+                  <a:tcPr anchor="ctr"/>
                 </a:tc>
                 <a:tc>
                   <a:txBody>
                     <a:bodyPr/>
                     <a:lstStyle/>
                     <a:p>
+                      <a:pPr algn="ctr"/>
                       <a:r>
                         <a:rPr lang="en-GB" dirty="0" smtClean="0"/>
                         <a:t>Disadvantages</a:t>
@@ -5480,7 +5998,7 @@
                       <a:endParaRPr lang="en-GB" dirty="0"/>
                     </a:p>
                   </a:txBody>
-                  <a:tcPr/>
+                  <a:tcPr anchor="ctr"/>
                 </a:tc>
               </a:tr>
               <a:tr h="810090">
@@ -5534,7 +6052,7 @@
                     <a:bodyPr/>
                     <a:lstStyle/>
                     <a:p>
-                      <a:endParaRPr lang="en-GB"/>
+                      <a:endParaRPr lang="en-GB" dirty="0"/>
                     </a:p>
                   </a:txBody>
                   <a:tcPr/>
@@ -5586,7 +6104,7 @@
                     <a:bodyPr/>
                     <a:lstStyle/>
                     <a:p>
-                      <a:endParaRPr lang="en-GB"/>
+                      <a:endParaRPr lang="en-GB" dirty="0"/>
                     </a:p>
                   </a:txBody>
                   <a:tcPr/>
@@ -5651,166 +6169,7 @@
     </p:spTree>
     <p:extLst>
       <p:ext uri="{BB962C8B-B14F-4D97-AF65-F5344CB8AC3E}">
-        <p14:creationId xmlns:p14="http://schemas.microsoft.com/office/powerpoint/2010/main" xmlns="" val="1053858350"/>
-      </p:ext>
-    </p:extLst>
-  </p:cSld>
-  <p:clrMapOvr>
-    <a:masterClrMapping/>
-  </p:clrMapOvr>
-  <p:timing>
-    <p:tnLst>
-      <p:par>
-        <p:cTn id="1" dur="indefinite" restart="never" nodeType="tmRoot"/>
-      </p:par>
-    </p:tnLst>
-  </p:timing>
-</p:sld>
-</file>
-
-<file path=ppt/slides/slide9.xml><?xml version="1.0" encoding="utf-8"?>
-<p:sld xmlns:a="http://schemas.openxmlformats.org/drawingml/2006/main" xmlns:r="http://schemas.openxmlformats.org/officeDocument/2006/relationships" xmlns:p="http://schemas.openxmlformats.org/presentationml/2006/main">
-  <p:cSld>
-    <p:spTree>
-      <p:nvGrpSpPr>
-        <p:cNvPr id="1" name=""/>
-        <p:cNvGrpSpPr/>
-        <p:nvPr/>
-      </p:nvGrpSpPr>
-      <p:grpSpPr>
-        <a:xfrm>
-          <a:off x="0" y="0"/>
-          <a:ext cx="0" cy="0"/>
-          <a:chOff x="0" y="0"/>
-          <a:chExt cx="0" cy="0"/>
-        </a:xfrm>
-      </p:grpSpPr>
-      <p:sp>
-        <p:nvSpPr>
-          <p:cNvPr id="2" name="TextBox 1"/>
-          <p:cNvSpPr txBox="1"/>
-          <p:nvPr/>
-        </p:nvSpPr>
-        <p:spPr>
-          <a:xfrm>
-            <a:off x="0" y="762963"/>
-            <a:ext cx="9144000" cy="2308324"/>
-          </a:xfrm>
-          <a:prstGeom prst="rect">
-            <a:avLst/>
-          </a:prstGeom>
-          <a:noFill/>
-        </p:spPr>
-        <p:txBody>
-          <a:bodyPr wrap="square" rtlCol="0">
-            <a:spAutoFit/>
-          </a:bodyPr>
-          <a:lstStyle/>
-          <a:p>
-            <a:pPr algn="ctr"/>
-            <a:r>
-              <a:rPr lang="en-GB" sz="7200" b="1" dirty="0" smtClean="0">
-                <a:solidFill>
-                  <a:srgbClr val="FF0000"/>
-                </a:solidFill>
-                <a:latin typeface="Comic Sans MS" panose="030F0702030302020204" pitchFamily="66" charset="0"/>
-              </a:rPr>
-              <a:t>Let’s see your credit cards </a:t>
-            </a:r>
-            <a:endParaRPr lang="en-GB" sz="7200" b="1" dirty="0">
-              <a:solidFill>
-                <a:srgbClr val="FF0000"/>
-              </a:solidFill>
-              <a:latin typeface="Comic Sans MS" panose="030F0702030302020204" pitchFamily="66" charset="0"/>
-            </a:endParaRPr>
-          </a:p>
-        </p:txBody>
-      </p:sp>
-      <p:sp>
-        <p:nvSpPr>
-          <p:cNvPr id="3" name="Rectangle 2"/>
-          <p:cNvSpPr/>
-          <p:nvPr/>
-        </p:nvSpPr>
-        <p:spPr>
-          <a:xfrm>
-            <a:off x="2051720" y="3429000"/>
-            <a:ext cx="5256584" cy="2592288"/>
-          </a:xfrm>
-          <a:prstGeom prst="rect">
-            <a:avLst/>
-          </a:prstGeom>
-          <a:noFill/>
-          <a:ln w="76200">
-            <a:solidFill>
-              <a:schemeClr val="tx1"/>
-            </a:solidFill>
-          </a:ln>
-        </p:spPr>
-        <p:style>
-          <a:lnRef idx="2">
-            <a:schemeClr val="accent1">
-              <a:shade val="50000"/>
-            </a:schemeClr>
-          </a:lnRef>
-          <a:fillRef idx="1">
-            <a:schemeClr val="accent1"/>
-          </a:fillRef>
-          <a:effectRef idx="0">
-            <a:schemeClr val="accent1"/>
-          </a:effectRef>
-          <a:fontRef idx="minor">
-            <a:schemeClr val="lt1"/>
-          </a:fontRef>
-        </p:style>
-        <p:txBody>
-          <a:bodyPr rtlCol="0" anchor="ctr"/>
-          <a:lstStyle/>
-          <a:p>
-            <a:pPr algn="ctr"/>
-            <a:endParaRPr lang="en-GB"/>
-          </a:p>
-        </p:txBody>
-      </p:sp>
-      <p:sp>
-        <p:nvSpPr>
-          <p:cNvPr id="4" name="TextBox 3"/>
-          <p:cNvSpPr txBox="1"/>
-          <p:nvPr/>
-        </p:nvSpPr>
-        <p:spPr>
-          <a:xfrm>
-            <a:off x="4283968" y="3617147"/>
-            <a:ext cx="792088" cy="2215991"/>
-          </a:xfrm>
-          <a:prstGeom prst="rect">
-            <a:avLst/>
-          </a:prstGeom>
-          <a:noFill/>
-        </p:spPr>
-        <p:txBody>
-          <a:bodyPr wrap="square" rtlCol="0">
-            <a:spAutoFit/>
-          </a:bodyPr>
-          <a:lstStyle/>
-          <a:p>
-            <a:pPr algn="ctr"/>
-            <a:r>
-              <a:rPr lang="en-GB" sz="13800" b="1" dirty="0" smtClean="0">
-                <a:latin typeface="Comic Sans MS" panose="030F0702030302020204" pitchFamily="66" charset="0"/>
-              </a:rPr>
-              <a:t>?</a:t>
-            </a:r>
-            <a:endParaRPr lang="en-GB" sz="13800" b="1" dirty="0">
-              <a:latin typeface="Comic Sans MS" panose="030F0702030302020204" pitchFamily="66" charset="0"/>
-            </a:endParaRPr>
-          </a:p>
-        </p:txBody>
-      </p:sp>
-    </p:spTree>
-    <p:extLst>
-      <p:ext uri="{BB962C8B-B14F-4D97-AF65-F5344CB8AC3E}">
-        <p14:creationId xmlns:p14="http://schemas.microsoft.com/office/powerpoint/2010/main" xmlns="" val="2946536019"/>
+        <p14:creationId xmlns="" xmlns:p14="http://schemas.microsoft.com/office/powerpoint/2010/main" val="1053858350"/>
       </p:ext>
     </p:extLst>
   </p:cSld>

</xml_diff>

<commit_message>
modify credit card task remove limit
modify credit card task remove limit
</commit_message>
<xml_diff>
--- a/15finance/02 Credit Cards.pptx
+++ b/15finance/02 Credit Cards.pptx
@@ -208,7 +208,7 @@
             <a:fld id="{01F3B2B3-38C5-4CBC-9C35-0FEB655F0CFE}" type="datetimeFigureOut">
               <a:rPr lang="en-GB" smtClean="0"/>
               <a:pPr/>
-              <a:t>20/11/2016</a:t>
+              <a:t>22/11/2016</a:t>
             </a:fld>
             <a:endParaRPr lang="en-GB"/>
           </a:p>
@@ -746,7 +746,7 @@
     </p:spTree>
     <p:extLst>
       <p:ext uri="{BB962C8B-B14F-4D97-AF65-F5344CB8AC3E}">
-        <p14:creationId xmlns="" xmlns:p14="http://schemas.microsoft.com/office/powerpoint/2010/main" val="3517865856"/>
+        <p14:creationId xmlns:p14="http://schemas.microsoft.com/office/powerpoint/2010/main" xmlns="" val="3517865856"/>
       </p:ext>
     </p:extLst>
   </p:cSld>
@@ -1020,7 +1020,7 @@
             <a:fld id="{245E5DCC-A267-489E-8C4B-0C8A611A1888}" type="datetimeFigureOut">
               <a:rPr lang="en-GB" smtClean="0"/>
               <a:pPr/>
-              <a:t>20/11/2016</a:t>
+              <a:t>22/11/2016</a:t>
             </a:fld>
             <a:endParaRPr lang="en-GB"/>
           </a:p>
@@ -1072,7 +1072,7 @@
     </p:spTree>
     <p:extLst>
       <p:ext uri="{BB962C8B-B14F-4D97-AF65-F5344CB8AC3E}">
-        <p14:creationId xmlns="" xmlns:p14="http://schemas.microsoft.com/office/powerpoint/2010/main" val="3795135744"/>
+        <p14:creationId xmlns:p14="http://schemas.microsoft.com/office/powerpoint/2010/main" xmlns="" val="3795135744"/>
       </p:ext>
     </p:extLst>
   </p:cSld>
@@ -1192,7 +1192,7 @@
             <a:fld id="{245E5DCC-A267-489E-8C4B-0C8A611A1888}" type="datetimeFigureOut">
               <a:rPr lang="en-GB" smtClean="0"/>
               <a:pPr/>
-              <a:t>20/11/2016</a:t>
+              <a:t>22/11/2016</a:t>
             </a:fld>
             <a:endParaRPr lang="en-GB"/>
           </a:p>
@@ -1244,7 +1244,7 @@
     </p:spTree>
     <p:extLst>
       <p:ext uri="{BB962C8B-B14F-4D97-AF65-F5344CB8AC3E}">
-        <p14:creationId xmlns="" xmlns:p14="http://schemas.microsoft.com/office/powerpoint/2010/main" val="1650520662"/>
+        <p14:creationId xmlns:p14="http://schemas.microsoft.com/office/powerpoint/2010/main" xmlns="" val="1650520662"/>
       </p:ext>
     </p:extLst>
   </p:cSld>
@@ -1374,7 +1374,7 @@
             <a:fld id="{245E5DCC-A267-489E-8C4B-0C8A611A1888}" type="datetimeFigureOut">
               <a:rPr lang="en-GB" smtClean="0"/>
               <a:pPr/>
-              <a:t>20/11/2016</a:t>
+              <a:t>22/11/2016</a:t>
             </a:fld>
             <a:endParaRPr lang="en-GB"/>
           </a:p>
@@ -1426,7 +1426,7 @@
     </p:spTree>
     <p:extLst>
       <p:ext uri="{BB962C8B-B14F-4D97-AF65-F5344CB8AC3E}">
-        <p14:creationId xmlns="" xmlns:p14="http://schemas.microsoft.com/office/powerpoint/2010/main" val="4271198208"/>
+        <p14:creationId xmlns:p14="http://schemas.microsoft.com/office/powerpoint/2010/main" xmlns="" val="4271198208"/>
       </p:ext>
     </p:extLst>
   </p:cSld>
@@ -1546,7 +1546,7 @@
             <a:fld id="{245E5DCC-A267-489E-8C4B-0C8A611A1888}" type="datetimeFigureOut">
               <a:rPr lang="en-GB" smtClean="0"/>
               <a:pPr/>
-              <a:t>20/11/2016</a:t>
+              <a:t>22/11/2016</a:t>
             </a:fld>
             <a:endParaRPr lang="en-GB"/>
           </a:p>
@@ -1598,7 +1598,7 @@
     </p:spTree>
     <p:extLst>
       <p:ext uri="{BB962C8B-B14F-4D97-AF65-F5344CB8AC3E}">
-        <p14:creationId xmlns="" xmlns:p14="http://schemas.microsoft.com/office/powerpoint/2010/main" val="3395567130"/>
+        <p14:creationId xmlns:p14="http://schemas.microsoft.com/office/powerpoint/2010/main" xmlns="" val="3395567130"/>
       </p:ext>
     </p:extLst>
   </p:cSld>
@@ -1794,7 +1794,7 @@
             <a:fld id="{245E5DCC-A267-489E-8C4B-0C8A611A1888}" type="datetimeFigureOut">
               <a:rPr lang="en-GB" smtClean="0"/>
               <a:pPr/>
-              <a:t>20/11/2016</a:t>
+              <a:t>22/11/2016</a:t>
             </a:fld>
             <a:endParaRPr lang="en-GB"/>
           </a:p>
@@ -1846,7 +1846,7 @@
     </p:spTree>
     <p:extLst>
       <p:ext uri="{BB962C8B-B14F-4D97-AF65-F5344CB8AC3E}">
-        <p14:creationId xmlns="" xmlns:p14="http://schemas.microsoft.com/office/powerpoint/2010/main" val="741615603"/>
+        <p14:creationId xmlns:p14="http://schemas.microsoft.com/office/powerpoint/2010/main" xmlns="" val="741615603"/>
       </p:ext>
     </p:extLst>
   </p:cSld>
@@ -2084,7 +2084,7 @@
             <a:fld id="{245E5DCC-A267-489E-8C4B-0C8A611A1888}" type="datetimeFigureOut">
               <a:rPr lang="en-GB" smtClean="0"/>
               <a:pPr/>
-              <a:t>20/11/2016</a:t>
+              <a:t>22/11/2016</a:t>
             </a:fld>
             <a:endParaRPr lang="en-GB"/>
           </a:p>
@@ -2136,7 +2136,7 @@
     </p:spTree>
     <p:extLst>
       <p:ext uri="{BB962C8B-B14F-4D97-AF65-F5344CB8AC3E}">
-        <p14:creationId xmlns="" xmlns:p14="http://schemas.microsoft.com/office/powerpoint/2010/main" val="2595005895"/>
+        <p14:creationId xmlns:p14="http://schemas.microsoft.com/office/powerpoint/2010/main" xmlns="" val="2595005895"/>
       </p:ext>
     </p:extLst>
   </p:cSld>
@@ -2508,7 +2508,7 @@
             <a:fld id="{245E5DCC-A267-489E-8C4B-0C8A611A1888}" type="datetimeFigureOut">
               <a:rPr lang="en-GB" smtClean="0"/>
               <a:pPr/>
-              <a:t>20/11/2016</a:t>
+              <a:t>22/11/2016</a:t>
             </a:fld>
             <a:endParaRPr lang="en-GB"/>
           </a:p>
@@ -2560,7 +2560,7 @@
     </p:spTree>
     <p:extLst>
       <p:ext uri="{BB962C8B-B14F-4D97-AF65-F5344CB8AC3E}">
-        <p14:creationId xmlns="" xmlns:p14="http://schemas.microsoft.com/office/powerpoint/2010/main" val="2824062158"/>
+        <p14:creationId xmlns:p14="http://schemas.microsoft.com/office/powerpoint/2010/main" xmlns="" val="2824062158"/>
       </p:ext>
     </p:extLst>
   </p:cSld>
@@ -2628,7 +2628,7 @@
             <a:fld id="{245E5DCC-A267-489E-8C4B-0C8A611A1888}" type="datetimeFigureOut">
               <a:rPr lang="en-GB" smtClean="0"/>
               <a:pPr/>
-              <a:t>20/11/2016</a:t>
+              <a:t>22/11/2016</a:t>
             </a:fld>
             <a:endParaRPr lang="en-GB"/>
           </a:p>
@@ -2680,7 +2680,7 @@
     </p:spTree>
     <p:extLst>
       <p:ext uri="{BB962C8B-B14F-4D97-AF65-F5344CB8AC3E}">
-        <p14:creationId xmlns="" xmlns:p14="http://schemas.microsoft.com/office/powerpoint/2010/main" val="1093719169"/>
+        <p14:creationId xmlns:p14="http://schemas.microsoft.com/office/powerpoint/2010/main" xmlns="" val="1093719169"/>
       </p:ext>
     </p:extLst>
   </p:cSld>
@@ -2725,7 +2725,7 @@
             <a:fld id="{245E5DCC-A267-489E-8C4B-0C8A611A1888}" type="datetimeFigureOut">
               <a:rPr lang="en-GB" smtClean="0"/>
               <a:pPr/>
-              <a:t>20/11/2016</a:t>
+              <a:t>22/11/2016</a:t>
             </a:fld>
             <a:endParaRPr lang="en-GB"/>
           </a:p>
@@ -2777,7 +2777,7 @@
     </p:spTree>
     <p:extLst>
       <p:ext uri="{BB962C8B-B14F-4D97-AF65-F5344CB8AC3E}">
-        <p14:creationId xmlns="" xmlns:p14="http://schemas.microsoft.com/office/powerpoint/2010/main" val="3666968362"/>
+        <p14:creationId xmlns:p14="http://schemas.microsoft.com/office/powerpoint/2010/main" xmlns="" val="3666968362"/>
       </p:ext>
     </p:extLst>
   </p:cSld>
@@ -3004,7 +3004,7 @@
             <a:fld id="{245E5DCC-A267-489E-8C4B-0C8A611A1888}" type="datetimeFigureOut">
               <a:rPr lang="en-GB" smtClean="0"/>
               <a:pPr/>
-              <a:t>20/11/2016</a:t>
+              <a:t>22/11/2016</a:t>
             </a:fld>
             <a:endParaRPr lang="en-GB"/>
           </a:p>
@@ -3056,7 +3056,7 @@
     </p:spTree>
     <p:extLst>
       <p:ext uri="{BB962C8B-B14F-4D97-AF65-F5344CB8AC3E}">
-        <p14:creationId xmlns="" xmlns:p14="http://schemas.microsoft.com/office/powerpoint/2010/main" val="3793018940"/>
+        <p14:creationId xmlns:p14="http://schemas.microsoft.com/office/powerpoint/2010/main" xmlns="" val="3793018940"/>
       </p:ext>
     </p:extLst>
   </p:cSld>
@@ -3259,7 +3259,7 @@
             <a:fld id="{245E5DCC-A267-489E-8C4B-0C8A611A1888}" type="datetimeFigureOut">
               <a:rPr lang="en-GB" smtClean="0"/>
               <a:pPr/>
-              <a:t>20/11/2016</a:t>
+              <a:t>22/11/2016</a:t>
             </a:fld>
             <a:endParaRPr lang="en-GB"/>
           </a:p>
@@ -3311,7 +3311,7 @@
     </p:spTree>
     <p:extLst>
       <p:ext uri="{BB962C8B-B14F-4D97-AF65-F5344CB8AC3E}">
-        <p14:creationId xmlns="" xmlns:p14="http://schemas.microsoft.com/office/powerpoint/2010/main" val="1356301842"/>
+        <p14:creationId xmlns:p14="http://schemas.microsoft.com/office/powerpoint/2010/main" xmlns="" val="1356301842"/>
       </p:ext>
     </p:extLst>
   </p:cSld>
@@ -3474,7 +3474,7 @@
             <a:fld id="{245E5DCC-A267-489E-8C4B-0C8A611A1888}" type="datetimeFigureOut">
               <a:rPr lang="en-GB" smtClean="0"/>
               <a:pPr/>
-              <a:t>20/11/2016</a:t>
+              <a:t>22/11/2016</a:t>
             </a:fld>
             <a:endParaRPr lang="en-GB"/>
           </a:p>
@@ -3562,7 +3562,7 @@
     </p:spTree>
     <p:extLst>
       <p:ext uri="{BB962C8B-B14F-4D97-AF65-F5344CB8AC3E}">
-        <p14:creationId xmlns="" xmlns:p14="http://schemas.microsoft.com/office/powerpoint/2010/main" val="4272518248"/>
+        <p14:creationId xmlns:p14="http://schemas.microsoft.com/office/powerpoint/2010/main" xmlns="" val="4272518248"/>
       </p:ext>
     </p:extLst>
   </p:cSld>
@@ -3900,7 +3900,7 @@
     </p:spTree>
     <p:extLst>
       <p:ext uri="{BB962C8B-B14F-4D97-AF65-F5344CB8AC3E}">
-        <p14:creationId xmlns="" xmlns:p14="http://schemas.microsoft.com/office/powerpoint/2010/main" val="3429634830"/>
+        <p14:creationId xmlns:p14="http://schemas.microsoft.com/office/powerpoint/2010/main" xmlns="" val="3429634830"/>
       </p:ext>
     </p:extLst>
   </p:cSld>
@@ -4365,7 +4365,7 @@
           <a:blip r:embed="rId2" cstate="print">
             <a:extLst>
               <a:ext uri="{28A0092B-C50C-407E-A947-70E740481C1C}">
-                <a14:useLocalDpi xmlns="" xmlns:a14="http://schemas.microsoft.com/office/drawing/2010/main" val="0"/>
+                <a14:useLocalDpi xmlns:a14="http://schemas.microsoft.com/office/drawing/2010/main" xmlns="" val="0"/>
               </a:ext>
             </a:extLst>
           </a:blip>
@@ -4388,14 +4388,14 @@
           </a:ln>
           <a:extLst>
             <a:ext uri="{909E8E84-426E-40DD-AFC4-6F175D3DCCD1}">
-              <a14:hiddenFill xmlns="" xmlns:a14="http://schemas.microsoft.com/office/drawing/2010/main">
+              <a14:hiddenFill xmlns:a14="http://schemas.microsoft.com/office/drawing/2010/main" xmlns="">
                 <a:solidFill>
                   <a:schemeClr val="accent1"/>
                 </a:solidFill>
               </a14:hiddenFill>
             </a:ext>
             <a:ext uri="{91240B29-F687-4F45-9708-019B960494DF}">
-              <a14:hiddenLine xmlns="" xmlns:a14="http://schemas.microsoft.com/office/drawing/2010/main" w="9525">
+              <a14:hiddenLine xmlns:a14="http://schemas.microsoft.com/office/drawing/2010/main" xmlns="" w="9525">
                 <a:solidFill>
                   <a:schemeClr val="tx1"/>
                 </a:solidFill>
@@ -4410,7 +4410,7 @@
     </p:spTree>
     <p:extLst>
       <p:ext uri="{BB962C8B-B14F-4D97-AF65-F5344CB8AC3E}">
-        <p14:creationId xmlns="" xmlns:p14="http://schemas.microsoft.com/office/powerpoint/2010/main" val="2399019395"/>
+        <p14:creationId xmlns:p14="http://schemas.microsoft.com/office/powerpoint/2010/main" xmlns="" val="2399019395"/>
       </p:ext>
     </p:extLst>
   </p:cSld>
@@ -4520,7 +4520,7 @@
     </p:spTree>
     <p:extLst>
       <p:ext uri="{BB962C8B-B14F-4D97-AF65-F5344CB8AC3E}">
-        <p14:creationId xmlns="" xmlns:p14="http://schemas.microsoft.com/office/powerpoint/2010/main" val="3410360413"/>
+        <p14:creationId xmlns:p14="http://schemas.microsoft.com/office/powerpoint/2010/main" xmlns="" val="3410360413"/>
       </p:ext>
     </p:extLst>
   </p:cSld>
@@ -4896,7 +4896,7 @@
     </p:spTree>
     <p:extLst>
       <p:ext uri="{BB962C8B-B14F-4D97-AF65-F5344CB8AC3E}">
-        <p14:creationId xmlns="" xmlns:p14="http://schemas.microsoft.com/office/powerpoint/2010/main" val="1780648371"/>
+        <p14:creationId xmlns:p14="http://schemas.microsoft.com/office/powerpoint/2010/main" xmlns="" val="1780648371"/>
       </p:ext>
     </p:extLst>
   </p:cSld>
@@ -5926,7 +5926,7 @@
     </p:spTree>
     <p:extLst>
       <p:ext uri="{BB962C8B-B14F-4D97-AF65-F5344CB8AC3E}">
-        <p14:creationId xmlns="" xmlns:p14="http://schemas.microsoft.com/office/powerpoint/2010/main" val="1053858350"/>
+        <p14:creationId xmlns:p14="http://schemas.microsoft.com/office/powerpoint/2010/main" xmlns="" val="1053858350"/>
       </p:ext>
     </p:extLst>
   </p:cSld>
@@ -6085,7 +6085,7 @@
     </p:spTree>
     <p:extLst>
       <p:ext uri="{BB962C8B-B14F-4D97-AF65-F5344CB8AC3E}">
-        <p14:creationId xmlns="" xmlns:p14="http://schemas.microsoft.com/office/powerpoint/2010/main" val="2946536019"/>
+        <p14:creationId xmlns:p14="http://schemas.microsoft.com/office/powerpoint/2010/main" xmlns="" val="2946536019"/>
       </p:ext>
     </p:extLst>
   </p:cSld>
@@ -6174,7 +6174,7 @@
     </p:spTree>
     <p:extLst>
       <p:ext uri="{BB962C8B-B14F-4D97-AF65-F5344CB8AC3E}">
-        <p14:creationId xmlns="" xmlns:p14="http://schemas.microsoft.com/office/powerpoint/2010/main" val="509015518"/>
+        <p14:creationId xmlns:p14="http://schemas.microsoft.com/office/powerpoint/2010/main" xmlns="" val="509015518"/>
       </p:ext>
     </p:extLst>
   </p:cSld>
@@ -6273,7 +6273,7 @@
     </p:spTree>
     <p:extLst>
       <p:ext uri="{BB962C8B-B14F-4D97-AF65-F5344CB8AC3E}">
-        <p14:creationId xmlns="" xmlns:p14="http://schemas.microsoft.com/office/powerpoint/2010/main" val="1087716692"/>
+        <p14:creationId xmlns:p14="http://schemas.microsoft.com/office/powerpoint/2010/main" xmlns="" val="1087716692"/>
       </p:ext>
     </p:extLst>
   </p:cSld>
@@ -6357,7 +6357,7 @@
     </p:spTree>
     <p:extLst>
       <p:ext uri="{BB962C8B-B14F-4D97-AF65-F5344CB8AC3E}">
-        <p14:creationId xmlns="" xmlns:p14="http://schemas.microsoft.com/office/powerpoint/2010/main" val="2796773158"/>
+        <p14:creationId xmlns:p14="http://schemas.microsoft.com/office/powerpoint/2010/main" xmlns="" val="2796773158"/>
       </p:ext>
     </p:extLst>
   </p:cSld>
@@ -6434,7 +6434,7 @@
           <a:blip r:embed="rId2" cstate="print">
             <a:extLst>
               <a:ext uri="{28A0092B-C50C-407E-A947-70E740481C1C}">
-                <a14:useLocalDpi xmlns="" xmlns:a14="http://schemas.microsoft.com/office/drawing/2010/main" val="0"/>
+                <a14:useLocalDpi xmlns:a14="http://schemas.microsoft.com/office/drawing/2010/main" xmlns="" val="0"/>
               </a:ext>
             </a:extLst>
           </a:blip>
@@ -6454,7 +6454,7 @@
           <a:noFill/>
           <a:extLst>
             <a:ext uri="{909E8E84-426E-40DD-AFC4-6F175D3DCCD1}">
-              <a14:hiddenFill xmlns="" xmlns:a14="http://schemas.microsoft.com/office/drawing/2010/main">
+              <a14:hiddenFill xmlns:a14="http://schemas.microsoft.com/office/drawing/2010/main" xmlns="">
                 <a:solidFill>
                   <a:srgbClr val="FFFFFF"/>
                 </a:solidFill>
@@ -6475,7 +6475,7 @@
           <a:blip r:embed="rId3" cstate="print">
             <a:extLst>
               <a:ext uri="{28A0092B-C50C-407E-A947-70E740481C1C}">
-                <a14:useLocalDpi xmlns="" xmlns:a14="http://schemas.microsoft.com/office/drawing/2010/main" val="0"/>
+                <a14:useLocalDpi xmlns:a14="http://schemas.microsoft.com/office/drawing/2010/main" xmlns="" val="0"/>
               </a:ext>
             </a:extLst>
           </a:blip>
@@ -6495,7 +6495,7 @@
           <a:noFill/>
           <a:extLst>
             <a:ext uri="{909E8E84-426E-40DD-AFC4-6F175D3DCCD1}">
-              <a14:hiddenFill xmlns="" xmlns:a14="http://schemas.microsoft.com/office/drawing/2010/main">
+              <a14:hiddenFill xmlns:a14="http://schemas.microsoft.com/office/drawing/2010/main" xmlns="">
                 <a:solidFill>
                   <a:srgbClr val="FFFFFF"/>
                 </a:solidFill>
@@ -6516,7 +6516,7 @@
           <a:blip r:embed="rId4" cstate="print">
             <a:extLst>
               <a:ext uri="{28A0092B-C50C-407E-A947-70E740481C1C}">
-                <a14:useLocalDpi xmlns="" xmlns:a14="http://schemas.microsoft.com/office/drawing/2010/main" val="0"/>
+                <a14:useLocalDpi xmlns:a14="http://schemas.microsoft.com/office/drawing/2010/main" xmlns="" val="0"/>
               </a:ext>
             </a:extLst>
           </a:blip>
@@ -6536,7 +6536,7 @@
           <a:noFill/>
           <a:extLst>
             <a:ext uri="{909E8E84-426E-40DD-AFC4-6F175D3DCCD1}">
-              <a14:hiddenFill xmlns="" xmlns:a14="http://schemas.microsoft.com/office/drawing/2010/main">
+              <a14:hiddenFill xmlns:a14="http://schemas.microsoft.com/office/drawing/2010/main" xmlns="">
                 <a:solidFill>
                   <a:srgbClr val="FFFFFF"/>
                 </a:solidFill>
@@ -6548,7 +6548,7 @@
     </p:spTree>
     <p:extLst>
       <p:ext uri="{BB962C8B-B14F-4D97-AF65-F5344CB8AC3E}">
-        <p14:creationId xmlns="" xmlns:p14="http://schemas.microsoft.com/office/powerpoint/2010/main" val="3365826456"/>
+        <p14:creationId xmlns:p14="http://schemas.microsoft.com/office/powerpoint/2010/main" xmlns="" val="3365826456"/>
       </p:ext>
     </p:extLst>
   </p:cSld>
@@ -6695,7 +6695,7 @@
           <a:blip r:embed="rId3" cstate="print">
             <a:extLst>
               <a:ext uri="{28A0092B-C50C-407E-A947-70E740481C1C}">
-                <a14:useLocalDpi xmlns="" xmlns:a14="http://schemas.microsoft.com/office/drawing/2010/main" val="0"/>
+                <a14:useLocalDpi xmlns:a14="http://schemas.microsoft.com/office/drawing/2010/main" xmlns="" val="0"/>
               </a:ext>
             </a:extLst>
           </a:blip>
@@ -6715,7 +6715,7 @@
           <a:noFill/>
           <a:extLst>
             <a:ext uri="{909E8E84-426E-40DD-AFC4-6F175D3DCCD1}">
-              <a14:hiddenFill xmlns="" xmlns:a14="http://schemas.microsoft.com/office/drawing/2010/main">
+              <a14:hiddenFill xmlns:a14="http://schemas.microsoft.com/office/drawing/2010/main" xmlns="">
                 <a:solidFill>
                   <a:srgbClr val="FFFFFF"/>
                 </a:solidFill>
@@ -6736,7 +6736,7 @@
           <a:blip r:embed="rId4" cstate="print">
             <a:extLst>
               <a:ext uri="{28A0092B-C50C-407E-A947-70E740481C1C}">
-                <a14:useLocalDpi xmlns="" xmlns:a14="http://schemas.microsoft.com/office/drawing/2010/main" val="0"/>
+                <a14:useLocalDpi xmlns:a14="http://schemas.microsoft.com/office/drawing/2010/main" xmlns="" val="0"/>
               </a:ext>
             </a:extLst>
           </a:blip>
@@ -6754,7 +6754,7 @@
           <a:noFill/>
           <a:extLst>
             <a:ext uri="{909E8E84-426E-40DD-AFC4-6F175D3DCCD1}">
-              <a14:hiddenFill xmlns="" xmlns:a14="http://schemas.microsoft.com/office/drawing/2010/main">
+              <a14:hiddenFill xmlns:a14="http://schemas.microsoft.com/office/drawing/2010/main" xmlns="">
                 <a:solidFill>
                   <a:srgbClr val="FFFFFF"/>
                 </a:solidFill>
@@ -6775,7 +6775,7 @@
           <a:blip r:embed="rId5" cstate="print">
             <a:extLst>
               <a:ext uri="{28A0092B-C50C-407E-A947-70E740481C1C}">
-                <a14:useLocalDpi xmlns="" xmlns:a14="http://schemas.microsoft.com/office/drawing/2010/main" val="0"/>
+                <a14:useLocalDpi xmlns:a14="http://schemas.microsoft.com/office/drawing/2010/main" xmlns="" val="0"/>
               </a:ext>
             </a:extLst>
           </a:blip>
@@ -6795,7 +6795,7 @@
           <a:noFill/>
           <a:extLst>
             <a:ext uri="{909E8E84-426E-40DD-AFC4-6F175D3DCCD1}">
-              <a14:hiddenFill xmlns="" xmlns:a14="http://schemas.microsoft.com/office/drawing/2010/main">
+              <a14:hiddenFill xmlns:a14="http://schemas.microsoft.com/office/drawing/2010/main" xmlns="">
                 <a:solidFill>
                   <a:srgbClr val="FFFFFF"/>
                 </a:solidFill>
@@ -6816,7 +6816,7 @@
           <a:blip r:embed="rId6" cstate="print">
             <a:extLst>
               <a:ext uri="{28A0092B-C50C-407E-A947-70E740481C1C}">
-                <a14:useLocalDpi xmlns="" xmlns:a14="http://schemas.microsoft.com/office/drawing/2010/main" val="0"/>
+                <a14:useLocalDpi xmlns:a14="http://schemas.microsoft.com/office/drawing/2010/main" xmlns="" val="0"/>
               </a:ext>
             </a:extLst>
           </a:blip>
@@ -6836,7 +6836,7 @@
           <a:noFill/>
           <a:extLst>
             <a:ext uri="{909E8E84-426E-40DD-AFC4-6F175D3DCCD1}">
-              <a14:hiddenFill xmlns="" xmlns:a14="http://schemas.microsoft.com/office/drawing/2010/main">
+              <a14:hiddenFill xmlns:a14="http://schemas.microsoft.com/office/drawing/2010/main" xmlns="">
                 <a:solidFill>
                   <a:srgbClr val="FFFFFF"/>
                 </a:solidFill>
@@ -6848,7 +6848,7 @@
     </p:spTree>
     <p:extLst>
       <p:ext uri="{BB962C8B-B14F-4D97-AF65-F5344CB8AC3E}">
-        <p14:creationId xmlns="" xmlns:p14="http://schemas.microsoft.com/office/powerpoint/2010/main" val="310215174"/>
+        <p14:creationId xmlns:p14="http://schemas.microsoft.com/office/powerpoint/2010/main" xmlns="" val="310215174"/>
       </p:ext>
     </p:extLst>
   </p:cSld>
@@ -7118,7 +7118,7 @@
           <a:blip r:embed="rId2" cstate="print">
             <a:extLst>
               <a:ext uri="{28A0092B-C50C-407E-A947-70E740481C1C}">
-                <a14:useLocalDpi xmlns="" xmlns:a14="http://schemas.microsoft.com/office/drawing/2010/main" val="0"/>
+                <a14:useLocalDpi xmlns:a14="http://schemas.microsoft.com/office/drawing/2010/main" xmlns="" val="0"/>
               </a:ext>
             </a:extLst>
           </a:blip>
@@ -7138,7 +7138,7 @@
           <a:noFill/>
           <a:extLst>
             <a:ext uri="{909E8E84-426E-40DD-AFC4-6F175D3DCCD1}">
-              <a14:hiddenFill xmlns="" xmlns:a14="http://schemas.microsoft.com/office/drawing/2010/main">
+              <a14:hiddenFill xmlns:a14="http://schemas.microsoft.com/office/drawing/2010/main" xmlns="">
                 <a:solidFill>
                   <a:srgbClr val="FFFFFF"/>
                 </a:solidFill>
@@ -7159,7 +7159,7 @@
           <a:blip r:embed="rId3" cstate="print">
             <a:extLst>
               <a:ext uri="{28A0092B-C50C-407E-A947-70E740481C1C}">
-                <a14:useLocalDpi xmlns="" xmlns:a14="http://schemas.microsoft.com/office/drawing/2010/main" val="0"/>
+                <a14:useLocalDpi xmlns:a14="http://schemas.microsoft.com/office/drawing/2010/main" xmlns="" val="0"/>
               </a:ext>
             </a:extLst>
           </a:blip>
@@ -7177,7 +7177,7 @@
           <a:noFill/>
           <a:extLst>
             <a:ext uri="{909E8E84-426E-40DD-AFC4-6F175D3DCCD1}">
-              <a14:hiddenFill xmlns="" xmlns:a14="http://schemas.microsoft.com/office/drawing/2010/main">
+              <a14:hiddenFill xmlns:a14="http://schemas.microsoft.com/office/drawing/2010/main" xmlns="">
                 <a:solidFill>
                   <a:srgbClr val="FFFFFF"/>
                 </a:solidFill>
@@ -7198,7 +7198,7 @@
           <a:blip r:embed="rId4" cstate="print">
             <a:extLst>
               <a:ext uri="{28A0092B-C50C-407E-A947-70E740481C1C}">
-                <a14:useLocalDpi xmlns="" xmlns:a14="http://schemas.microsoft.com/office/drawing/2010/main" val="0"/>
+                <a14:useLocalDpi xmlns:a14="http://schemas.microsoft.com/office/drawing/2010/main" xmlns="" val="0"/>
               </a:ext>
             </a:extLst>
           </a:blip>
@@ -7218,7 +7218,7 @@
           <a:noFill/>
           <a:extLst>
             <a:ext uri="{909E8E84-426E-40DD-AFC4-6F175D3DCCD1}">
-              <a14:hiddenFill xmlns="" xmlns:a14="http://schemas.microsoft.com/office/drawing/2010/main">
+              <a14:hiddenFill xmlns:a14="http://schemas.microsoft.com/office/drawing/2010/main" xmlns="">
                 <a:solidFill>
                   <a:srgbClr val="FFFFFF"/>
                 </a:solidFill>
@@ -7239,7 +7239,7 @@
           <a:blip r:embed="rId5" cstate="print">
             <a:extLst>
               <a:ext uri="{28A0092B-C50C-407E-A947-70E740481C1C}">
-                <a14:useLocalDpi xmlns="" xmlns:a14="http://schemas.microsoft.com/office/drawing/2010/main" val="0"/>
+                <a14:useLocalDpi xmlns:a14="http://schemas.microsoft.com/office/drawing/2010/main" xmlns="" val="0"/>
               </a:ext>
             </a:extLst>
           </a:blip>
@@ -7259,7 +7259,7 @@
           <a:noFill/>
           <a:extLst>
             <a:ext uri="{909E8E84-426E-40DD-AFC4-6F175D3DCCD1}">
-              <a14:hiddenFill xmlns="" xmlns:a14="http://schemas.microsoft.com/office/drawing/2010/main">
+              <a14:hiddenFill xmlns:a14="http://schemas.microsoft.com/office/drawing/2010/main" xmlns="">
                 <a:solidFill>
                   <a:srgbClr val="FFFFFF"/>
                 </a:solidFill>
@@ -7271,7 +7271,7 @@
     </p:spTree>
     <p:extLst>
       <p:ext uri="{BB962C8B-B14F-4D97-AF65-F5344CB8AC3E}">
-        <p14:creationId xmlns="" xmlns:p14="http://schemas.microsoft.com/office/powerpoint/2010/main" val="292801570"/>
+        <p14:creationId xmlns:p14="http://schemas.microsoft.com/office/powerpoint/2010/main" xmlns="" val="292801570"/>
       </p:ext>
     </p:extLst>
   </p:cSld>
@@ -7481,7 +7481,7 @@
           <a:blip r:embed="rId2" cstate="print">
             <a:extLst>
               <a:ext uri="{28A0092B-C50C-407E-A947-70E740481C1C}">
-                <a14:useLocalDpi xmlns="" xmlns:a14="http://schemas.microsoft.com/office/drawing/2010/main" val="0"/>
+                <a14:useLocalDpi xmlns:a14="http://schemas.microsoft.com/office/drawing/2010/main" xmlns="" val="0"/>
               </a:ext>
             </a:extLst>
           </a:blip>
@@ -7501,7 +7501,7 @@
           <a:noFill/>
           <a:extLst>
             <a:ext uri="{909E8E84-426E-40DD-AFC4-6F175D3DCCD1}">
-              <a14:hiddenFill xmlns="" xmlns:a14="http://schemas.microsoft.com/office/drawing/2010/main">
+              <a14:hiddenFill xmlns:a14="http://schemas.microsoft.com/office/drawing/2010/main" xmlns="">
                 <a:solidFill>
                   <a:srgbClr val="FFFFFF"/>
                 </a:solidFill>
@@ -7522,7 +7522,7 @@
           <a:blip r:embed="rId3" cstate="print">
             <a:extLst>
               <a:ext uri="{28A0092B-C50C-407E-A947-70E740481C1C}">
-                <a14:useLocalDpi xmlns="" xmlns:a14="http://schemas.microsoft.com/office/drawing/2010/main" val="0"/>
+                <a14:useLocalDpi xmlns:a14="http://schemas.microsoft.com/office/drawing/2010/main" xmlns="" val="0"/>
               </a:ext>
             </a:extLst>
           </a:blip>
@@ -7540,7 +7540,7 @@
           <a:noFill/>
           <a:extLst>
             <a:ext uri="{909E8E84-426E-40DD-AFC4-6F175D3DCCD1}">
-              <a14:hiddenFill xmlns="" xmlns:a14="http://schemas.microsoft.com/office/drawing/2010/main">
+              <a14:hiddenFill xmlns:a14="http://schemas.microsoft.com/office/drawing/2010/main" xmlns="">
                 <a:solidFill>
                   <a:srgbClr val="FFFFFF"/>
                 </a:solidFill>
@@ -7561,7 +7561,7 @@
           <a:blip r:embed="rId4" cstate="print">
             <a:extLst>
               <a:ext uri="{28A0092B-C50C-407E-A947-70E740481C1C}">
-                <a14:useLocalDpi xmlns="" xmlns:a14="http://schemas.microsoft.com/office/drawing/2010/main" val="0"/>
+                <a14:useLocalDpi xmlns:a14="http://schemas.microsoft.com/office/drawing/2010/main" xmlns="" val="0"/>
               </a:ext>
             </a:extLst>
           </a:blip>
@@ -7581,7 +7581,7 @@
           <a:noFill/>
           <a:extLst>
             <a:ext uri="{909E8E84-426E-40DD-AFC4-6F175D3DCCD1}">
-              <a14:hiddenFill xmlns="" xmlns:a14="http://schemas.microsoft.com/office/drawing/2010/main">
+              <a14:hiddenFill xmlns:a14="http://schemas.microsoft.com/office/drawing/2010/main" xmlns="">
                 <a:solidFill>
                   <a:srgbClr val="FFFFFF"/>
                 </a:solidFill>
@@ -7602,7 +7602,7 @@
           <a:blip r:embed="rId5" cstate="print">
             <a:extLst>
               <a:ext uri="{28A0092B-C50C-407E-A947-70E740481C1C}">
-                <a14:useLocalDpi xmlns="" xmlns:a14="http://schemas.microsoft.com/office/drawing/2010/main" val="0"/>
+                <a14:useLocalDpi xmlns:a14="http://schemas.microsoft.com/office/drawing/2010/main" xmlns="" val="0"/>
               </a:ext>
             </a:extLst>
           </a:blip>
@@ -7622,7 +7622,7 @@
           <a:noFill/>
           <a:extLst>
             <a:ext uri="{909E8E84-426E-40DD-AFC4-6F175D3DCCD1}">
-              <a14:hiddenFill xmlns="" xmlns:a14="http://schemas.microsoft.com/office/drawing/2010/main">
+              <a14:hiddenFill xmlns:a14="http://schemas.microsoft.com/office/drawing/2010/main" xmlns="">
                 <a:solidFill>
                   <a:srgbClr val="FFFFFF"/>
                 </a:solidFill>
@@ -7665,7 +7665,7 @@
     </p:spTree>
     <p:extLst>
       <p:ext uri="{BB962C8B-B14F-4D97-AF65-F5344CB8AC3E}">
-        <p14:creationId xmlns="" xmlns:p14="http://schemas.microsoft.com/office/powerpoint/2010/main" val="4051213271"/>
+        <p14:creationId xmlns:p14="http://schemas.microsoft.com/office/powerpoint/2010/main" xmlns="" val="4051213271"/>
       </p:ext>
     </p:extLst>
   </p:cSld>
@@ -7947,7 +7947,7 @@
         <p:spPr>
           <a:xfrm>
             <a:off x="0" y="764704"/>
-            <a:ext cx="2843808" cy="2308324"/>
+            <a:ext cx="2843808" cy="2123658"/>
           </a:xfrm>
           <a:prstGeom prst="rect">
             <a:avLst/>
@@ -7990,7 +7990,7 @@
           </a:p>
           <a:p>
             <a:r>
-              <a:rPr lang="en-GB" b="1" i="1" dirty="0" smtClean="0">
+              <a:rPr lang="en-GB" sz="2400" b="1" i="1" dirty="0" smtClean="0">
                 <a:solidFill>
                   <a:srgbClr val="FF0000"/>
                 </a:solidFill>
@@ -7999,12 +7999,12 @@
               <a:t>APR:  </a:t>
             </a:r>
             <a:r>
-              <a:rPr lang="en-GB" b="1" i="1" dirty="0" smtClean="0">
+              <a:rPr lang="en-GB" sz="2400" b="1" i="1" dirty="0" smtClean="0">
                 <a:latin typeface="Comic Sans MS" panose="030F0702030302020204" pitchFamily="66" charset="0"/>
               </a:rPr>
               <a:t>18.9%</a:t>
             </a:r>
-            <a:endParaRPr lang="en-GB" b="1" i="1" dirty="0" smtClean="0">
+            <a:endParaRPr lang="en-GB" sz="2400" b="1" i="1" dirty="0" smtClean="0">
               <a:solidFill>
                 <a:srgbClr val="FF0000"/>
               </a:solidFill>
@@ -8024,20 +8024,54 @@
           </a:p>
           <a:p>
             <a:r>
-              <a:rPr lang="en-GB" b="1" i="1" dirty="0" smtClean="0">
-                <a:solidFill>
-                  <a:srgbClr val="FF0000"/>
-                </a:solidFill>
+              <a:rPr lang="en-GB" dirty="0" smtClean="0"/>
+              <a:t> </a:t>
+            </a:r>
+            <a:endParaRPr lang="en-GB" dirty="0"/>
+          </a:p>
+        </p:txBody>
+      </p:sp>
+      <p:sp>
+        <p:nvSpPr>
+          <p:cNvPr id="13" name="Rectangle 12"/>
+          <p:cNvSpPr/>
+          <p:nvPr/>
+        </p:nvSpPr>
+        <p:spPr>
+          <a:xfrm>
+            <a:off x="3144002" y="764704"/>
+            <a:ext cx="2724142" cy="1846659"/>
+          </a:xfrm>
+          <a:prstGeom prst="rect">
+            <a:avLst/>
+          </a:prstGeom>
+        </p:spPr>
+        <p:txBody>
+          <a:bodyPr wrap="square">
+            <a:spAutoFit/>
+          </a:bodyPr>
+          <a:lstStyle/>
+          <a:p>
+            <a:pPr lvl="1" algn="ctr"/>
+            <a:r>
+              <a:rPr lang="en-GB" b="1" i="1" u="sng" dirty="0" smtClean="0">
+                <a:effectLst/>
                 <a:latin typeface="Comic Sans MS" panose="030F0702030302020204" pitchFamily="66" charset="0"/>
               </a:rPr>
-              <a:t>Limit: </a:t>
-            </a:r>
-            <a:r>
-              <a:rPr lang="en-GB" b="1" i="1" dirty="0" smtClean="0">
+              <a:t>Capital One </a:t>
+            </a:r>
+          </a:p>
+          <a:p>
+            <a:pPr lvl="1" algn="ctr"/>
+            <a:r>
+              <a:rPr lang="en-GB" b="1" i="1" u="sng" dirty="0" smtClean="0">
+                <a:effectLst/>
                 <a:latin typeface="Comic Sans MS" panose="030F0702030302020204" pitchFamily="66" charset="0"/>
               </a:rPr>
-              <a:t>£1,200 </a:t>
-            </a:r>
+              <a:t>Classic Platinum</a:t>
+            </a:r>
+          </a:p>
+          <a:p>
             <a:endParaRPr lang="en-GB" b="1" i="1" dirty="0" smtClean="0">
               <a:solidFill>
                 <a:srgbClr val="FF0000"/>
@@ -8046,55 +8080,6 @@
             </a:endParaRPr>
           </a:p>
           <a:p>
-            <a:r>
-              <a:rPr lang="en-GB" dirty="0" smtClean="0"/>
-              <a:t> </a:t>
-            </a:r>
-            <a:endParaRPr lang="en-GB" dirty="0"/>
-          </a:p>
-        </p:txBody>
-      </p:sp>
-      <p:sp>
-        <p:nvSpPr>
-          <p:cNvPr id="13" name="Rectangle 12"/>
-          <p:cNvSpPr/>
-          <p:nvPr/>
-        </p:nvSpPr>
-        <p:spPr>
-          <a:xfrm>
-            <a:off x="3144002" y="764704"/>
-            <a:ext cx="2724142" cy="2031325"/>
-          </a:xfrm>
-          <a:prstGeom prst="rect">
-            <a:avLst/>
-          </a:prstGeom>
-        </p:spPr>
-        <p:txBody>
-          <a:bodyPr wrap="square">
-            <a:spAutoFit/>
-          </a:bodyPr>
-          <a:lstStyle/>
-          <a:p>
-            <a:pPr lvl="1" algn="ctr"/>
-            <a:r>
-              <a:rPr lang="en-GB" b="1" i="1" u="sng" dirty="0" smtClean="0">
-                <a:effectLst/>
-                <a:latin typeface="Comic Sans MS" panose="030F0702030302020204" pitchFamily="66" charset="0"/>
-              </a:rPr>
-              <a:t>Capital One </a:t>
-            </a:r>
-          </a:p>
-          <a:p>
-            <a:pPr lvl="1" algn="ctr"/>
-            <a:r>
-              <a:rPr lang="en-GB" b="1" i="1" u="sng" dirty="0" smtClean="0">
-                <a:effectLst/>
-                <a:latin typeface="Comic Sans MS" panose="030F0702030302020204" pitchFamily="66" charset="0"/>
-              </a:rPr>
-              <a:t>Classic Platinum</a:t>
-            </a:r>
-          </a:p>
-          <a:p>
             <a:endParaRPr lang="en-GB" b="1" i="1" dirty="0" smtClean="0">
               <a:solidFill>
                 <a:srgbClr val="FF0000"/>
@@ -8103,16 +8088,8 @@
             </a:endParaRPr>
           </a:p>
           <a:p>
-            <a:endParaRPr lang="en-GB" b="1" i="1" dirty="0" smtClean="0">
-              <a:solidFill>
-                <a:srgbClr val="FF0000"/>
-              </a:solidFill>
-              <a:latin typeface="Comic Sans MS" panose="030F0702030302020204" pitchFamily="66" charset="0"/>
-            </a:endParaRPr>
-          </a:p>
-          <a:p>
-            <a:r>
-              <a:rPr lang="en-GB" b="1" i="1" dirty="0" smtClean="0">
+            <a:r>
+              <a:rPr lang="en-GB" sz="2400" b="1" i="1" dirty="0" smtClean="0">
                 <a:solidFill>
                   <a:srgbClr val="FF0000"/>
                 </a:solidFill>
@@ -8121,13 +8098,13 @@
               <a:t>APR:   </a:t>
             </a:r>
             <a:r>
-              <a:rPr lang="en-GB" b="1" dirty="0" smtClean="0">
+              <a:rPr lang="en-GB" sz="2400" b="1" dirty="0" smtClean="0">
                 <a:effectLst/>
                 <a:latin typeface="Comic Sans MS" panose="030F0702030302020204" pitchFamily="66" charset="0"/>
               </a:rPr>
               <a:t>29.8%</a:t>
             </a:r>
-            <a:endParaRPr lang="en-GB" b="1" i="1" dirty="0" smtClean="0">
+            <a:endParaRPr lang="en-GB" sz="2400" b="1" i="1" dirty="0" smtClean="0">
               <a:solidFill>
                 <a:srgbClr val="FF0000"/>
               </a:solidFill>
@@ -8145,23 +8122,6 @@
               <a:t> </a:t>
             </a:r>
           </a:p>
-          <a:p>
-            <a:r>
-              <a:rPr lang="en-GB" b="1" i="1" dirty="0" smtClean="0">
-                <a:solidFill>
-                  <a:srgbClr val="FF0000"/>
-                </a:solidFill>
-                <a:latin typeface="Comic Sans MS" panose="030F0702030302020204" pitchFamily="66" charset="0"/>
-              </a:rPr>
-              <a:t>Limit: </a:t>
-            </a:r>
-            <a:r>
-              <a:rPr lang="en-GB" b="1" i="1" dirty="0" smtClean="0">
-                <a:latin typeface="Comic Sans MS" panose="030F0702030302020204" pitchFamily="66" charset="0"/>
-              </a:rPr>
-              <a:t>£1,500</a:t>
-            </a:r>
-          </a:p>
         </p:txBody>
       </p:sp>
       <p:sp>
@@ -8173,7 +8133,7 @@
         <p:spPr>
           <a:xfrm>
             <a:off x="6156176" y="764704"/>
-            <a:ext cx="2808312" cy="2031325"/>
+            <a:ext cx="2808312" cy="1846659"/>
           </a:xfrm>
           <a:prstGeom prst="rect">
             <a:avLst/>
@@ -8231,7 +8191,7 @@
           </a:p>
           <a:p>
             <a:r>
-              <a:rPr lang="en-GB" b="1" i="1" dirty="0" smtClean="0">
+              <a:rPr lang="en-GB" sz="2400" b="1" i="1" dirty="0" smtClean="0">
                 <a:solidFill>
                   <a:srgbClr val="FF0000"/>
                 </a:solidFill>
@@ -8240,12 +8200,12 @@
               <a:t>APR:   </a:t>
             </a:r>
             <a:r>
-              <a:rPr lang="en-GB" b="1" i="1" dirty="0" smtClean="0">
+              <a:rPr lang="en-GB" sz="2400" b="1" i="1" dirty="0" smtClean="0">
                 <a:latin typeface="Comic Sans MS" panose="030F0702030302020204" pitchFamily="66" charset="0"/>
               </a:rPr>
               <a:t>39.9%</a:t>
             </a:r>
-            <a:endParaRPr lang="en-GB" b="1" i="1" dirty="0" smtClean="0">
+            <a:endParaRPr lang="en-GB" sz="2400" b="1" i="1" dirty="0" smtClean="0">
               <a:solidFill>
                 <a:srgbClr val="FF0000"/>
               </a:solidFill>
@@ -8261,23 +8221,6 @@
                 <a:latin typeface="Comic Sans MS" panose="030F0702030302020204" pitchFamily="66" charset="0"/>
               </a:rPr>
               <a:t> </a:t>
-            </a:r>
-          </a:p>
-          <a:p>
-            <a:r>
-              <a:rPr lang="en-GB" b="1" i="1" dirty="0" smtClean="0">
-                <a:solidFill>
-                  <a:srgbClr val="FF0000"/>
-                </a:solidFill>
-                <a:latin typeface="Comic Sans MS" panose="030F0702030302020204" pitchFamily="66" charset="0"/>
-              </a:rPr>
-              <a:t>Limit: </a:t>
-            </a:r>
-            <a:r>
-              <a:rPr lang="en-GB" b="1" i="1" dirty="0" smtClean="0">
-                <a:latin typeface="Comic Sans MS" panose="030F0702030302020204" pitchFamily="66" charset="0"/>
-              </a:rPr>
-              <a:t>£3000</a:t>
             </a:r>
           </a:p>
         </p:txBody>
@@ -8294,7 +8237,7 @@
           <a:blip r:embed="rId2" cstate="print">
             <a:extLst>
               <a:ext uri="{28A0092B-C50C-407E-A947-70E740481C1C}">
-                <a14:useLocalDpi xmlns="" xmlns:a14="http://schemas.microsoft.com/office/drawing/2010/main" val="0"/>
+                <a14:useLocalDpi xmlns:a14="http://schemas.microsoft.com/office/drawing/2010/main" xmlns="" val="0"/>
               </a:ext>
             </a:extLst>
           </a:blip>
@@ -8319,7 +8262,7 @@
           </a:ln>
           <a:extLst>
             <a:ext uri="{909E8E84-426E-40DD-AFC4-6F175D3DCCD1}">
-              <a14:hiddenFill xmlns="" xmlns:a14="http://schemas.microsoft.com/office/drawing/2010/main">
+              <a14:hiddenFill xmlns:a14="http://schemas.microsoft.com/office/drawing/2010/main" xmlns="">
                 <a:solidFill>
                   <a:srgbClr val="FFFFFF"/>
                 </a:solidFill>
@@ -8340,7 +8283,7 @@
           <a:blip r:embed="rId3" cstate="print">
             <a:extLst>
               <a:ext uri="{28A0092B-C50C-407E-A947-70E740481C1C}">
-                <a14:useLocalDpi xmlns="" xmlns:a14="http://schemas.microsoft.com/office/drawing/2010/main" val="0"/>
+                <a14:useLocalDpi xmlns:a14="http://schemas.microsoft.com/office/drawing/2010/main" xmlns="" val="0"/>
               </a:ext>
             </a:extLst>
           </a:blip>
@@ -8363,7 +8306,7 @@
           </a:ln>
           <a:extLst>
             <a:ext uri="{909E8E84-426E-40DD-AFC4-6F175D3DCCD1}">
-              <a14:hiddenFill xmlns="" xmlns:a14="http://schemas.microsoft.com/office/drawing/2010/main">
+              <a14:hiddenFill xmlns:a14="http://schemas.microsoft.com/office/drawing/2010/main" xmlns="">
                 <a:solidFill>
                   <a:srgbClr val="FFFFFF"/>
                 </a:solidFill>
@@ -8386,7 +8329,7 @@
           <a:blip r:embed="rId5" cstate="print">
             <a:extLst>
               <a:ext uri="{28A0092B-C50C-407E-A947-70E740481C1C}">
-                <a14:useLocalDpi xmlns="" xmlns:a14="http://schemas.microsoft.com/office/drawing/2010/main" val="0"/>
+                <a14:useLocalDpi xmlns:a14="http://schemas.microsoft.com/office/drawing/2010/main" xmlns="" val="0"/>
               </a:ext>
             </a:extLst>
           </a:blip>
@@ -8406,7 +8349,7 @@
           <a:noFill/>
           <a:extLst>
             <a:ext uri="{909E8E84-426E-40DD-AFC4-6F175D3DCCD1}">
-              <a14:hiddenFill xmlns="" xmlns:a14="http://schemas.microsoft.com/office/drawing/2010/main">
+              <a14:hiddenFill xmlns:a14="http://schemas.microsoft.com/office/drawing/2010/main" xmlns="">
                 <a:solidFill>
                   <a:srgbClr val="FFFFFF"/>
                 </a:solidFill>
@@ -8424,7 +8367,7 @@
         <p:spPr>
           <a:xfrm>
             <a:off x="0" y="4327198"/>
-            <a:ext cx="9144000" cy="2308324"/>
+            <a:ext cx="9144000" cy="2400657"/>
           </a:xfrm>
           <a:prstGeom prst="rect">
             <a:avLst/>
@@ -8439,31 +8382,47 @@
           <a:p>
             <a:pPr algn="ctr"/>
             <a:r>
-              <a:rPr lang="en-GB" b="1" u="sng" dirty="0" smtClean="0">
+              <a:rPr lang="en-GB" sz="2400" b="1" u="sng" dirty="0" smtClean="0">
                 <a:latin typeface="Comic Sans MS" panose="030F0702030302020204" pitchFamily="66" charset="0"/>
               </a:rPr>
               <a:t>Your task </a:t>
             </a:r>
-          </a:p>
-          <a:p>
             <a:endParaRPr lang="en-GB" b="1" dirty="0">
               <a:latin typeface="Comic Sans MS" panose="030F0702030302020204" pitchFamily="66" charset="0"/>
             </a:endParaRPr>
           </a:p>
           <a:p>
             <a:r>
-              <a:rPr lang="en-GB" b="1" dirty="0" smtClean="0">
+              <a:rPr lang="en-GB" sz="2000" b="1" dirty="0" smtClean="0">
                 <a:solidFill>
                   <a:srgbClr val="FF0000"/>
                 </a:solidFill>
                 <a:latin typeface="Comic Sans MS" panose="030F0702030302020204" pitchFamily="66" charset="0"/>
               </a:rPr>
-              <a:t>On each credit card you have to borrow £1200 .</a:t>
-            </a:r>
-          </a:p>
-          <a:p>
-            <a:r>
-              <a:rPr lang="en-GB" b="1" dirty="0" smtClean="0">
+              <a:t>On each credit card you have to borrow </a:t>
+            </a:r>
+            <a:r>
+              <a:rPr lang="en-GB" sz="2800" b="1" dirty="0" smtClean="0">
+                <a:solidFill>
+                  <a:srgbClr val="FF0000"/>
+                </a:solidFill>
+                <a:latin typeface="Comic Sans MS" panose="030F0702030302020204" pitchFamily="66" charset="0"/>
+              </a:rPr>
+              <a:t>£1200 </a:t>
+            </a:r>
+            <a:r>
+              <a:rPr lang="en-GB" sz="2000" b="1" dirty="0" smtClean="0">
+                <a:solidFill>
+                  <a:srgbClr val="FF0000"/>
+                </a:solidFill>
+                <a:latin typeface="Comic Sans MS" panose="030F0702030302020204" pitchFamily="66" charset="0"/>
+              </a:rPr>
+              <a:t>.</a:t>
+            </a:r>
+          </a:p>
+          <a:p>
+            <a:r>
+              <a:rPr lang="en-GB" sz="2000" b="1" dirty="0" smtClean="0">
                 <a:solidFill>
                   <a:srgbClr val="FF0000"/>
                 </a:solidFill>
@@ -8478,13 +8437,13 @@
               <a:buChar char="•"/>
             </a:pPr>
             <a:r>
-              <a:rPr lang="en-GB" b="1" dirty="0">
+              <a:rPr lang="en-GB" sz="2000" b="1" dirty="0">
                 <a:latin typeface="Comic Sans MS" panose="030F0702030302020204" pitchFamily="66" charset="0"/>
               </a:rPr>
               <a:t> </a:t>
             </a:r>
             <a:r>
-              <a:rPr lang="en-GB" b="1" dirty="0" smtClean="0">
+              <a:rPr lang="en-GB" sz="2000" b="1" dirty="0" smtClean="0">
                 <a:latin typeface="Comic Sans MS" panose="030F0702030302020204" pitchFamily="66" charset="0"/>
               </a:rPr>
               <a:t>1 years</a:t>
@@ -8496,13 +8455,13 @@
               <a:buChar char="•"/>
             </a:pPr>
             <a:r>
-              <a:rPr lang="en-GB" b="1" dirty="0">
+              <a:rPr lang="en-GB" sz="2000" b="1" dirty="0">
                 <a:latin typeface="Comic Sans MS" panose="030F0702030302020204" pitchFamily="66" charset="0"/>
               </a:rPr>
               <a:t> </a:t>
             </a:r>
             <a:r>
-              <a:rPr lang="en-GB" b="1" dirty="0" smtClean="0">
+              <a:rPr lang="en-GB" sz="2000" b="1" dirty="0" smtClean="0">
                 <a:latin typeface="Comic Sans MS" panose="030F0702030302020204" pitchFamily="66" charset="0"/>
               </a:rPr>
               <a:t>3 years</a:t>
@@ -8514,13 +8473,13 @@
               <a:buChar char="•"/>
             </a:pPr>
             <a:r>
-              <a:rPr lang="en-GB" b="1" dirty="0">
+              <a:rPr lang="en-GB" sz="2000" b="1" dirty="0">
                 <a:latin typeface="Comic Sans MS" panose="030F0702030302020204" pitchFamily="66" charset="0"/>
               </a:rPr>
               <a:t> </a:t>
             </a:r>
             <a:r>
-              <a:rPr lang="en-GB" b="1" dirty="0" smtClean="0">
+              <a:rPr lang="en-GB" sz="2000" b="1" dirty="0" smtClean="0">
                 <a:latin typeface="Comic Sans MS" panose="030F0702030302020204" pitchFamily="66" charset="0"/>
               </a:rPr>
               <a:t>5 years </a:t>
@@ -8548,7 +8507,7 @@
         </p:nvSpPr>
         <p:spPr>
           <a:xfrm>
-            <a:off x="6876256" y="4653136"/>
+            <a:off x="7055768" y="4437112"/>
             <a:ext cx="2088232" cy="830997"/>
           </a:xfrm>
           <a:prstGeom prst="rect">
@@ -8573,7 +8532,7 @@
     </p:spTree>
     <p:extLst>
       <p:ext uri="{BB962C8B-B14F-4D97-AF65-F5344CB8AC3E}">
-        <p14:creationId xmlns="" xmlns:p14="http://schemas.microsoft.com/office/powerpoint/2010/main" val="1406374480"/>
+        <p14:creationId xmlns:p14="http://schemas.microsoft.com/office/powerpoint/2010/main" xmlns="" val="1406374480"/>
       </p:ext>
     </p:extLst>
   </p:cSld>

</xml_diff>